<commit_message>
Updates on Raspberry Pi + NCS Setup
</commit_message>
<xml_diff>
--- a/Raspberry Pi + NCS Setup.pptx
+++ b/Raspberry Pi + NCS Setup.pptx
@@ -11,7 +11,12 @@
     <p:sldId id="257" r:id="rId5"/>
     <p:sldId id="264" r:id="rId6"/>
     <p:sldId id="265" r:id="rId7"/>
-    <p:sldId id="262" r:id="rId8"/>
+    <p:sldId id="266" r:id="rId8"/>
+    <p:sldId id="267" r:id="rId9"/>
+    <p:sldId id="270" r:id="rId10"/>
+    <p:sldId id="268" r:id="rId11"/>
+    <p:sldId id="269" r:id="rId12"/>
+    <p:sldId id="262" r:id="rId13"/>
   </p:sldIdLst>
   <p:sldSz cx="9144000" cy="6858000" type="screen4x3"/>
   <p:notesSz cx="6858000" cy="9144000"/>
@@ -295,7 +300,7 @@
             <a:fld id="{F74D16A0-72E3-4062-88A7-C275730AB40C}" type="datetimeFigureOut">
               <a:rPr lang="ko-KR" altLang="en-US" smtClean="0"/>
               <a:pPr/>
-              <a:t>2022-12-27</a:t>
+              <a:t>2022-12-29</a:t>
             </a:fld>
             <a:endParaRPr lang="ko-KR" altLang="en-US"/>
           </a:p>
@@ -462,7 +467,7 @@
             <a:fld id="{F74D16A0-72E3-4062-88A7-C275730AB40C}" type="datetimeFigureOut">
               <a:rPr lang="ko-KR" altLang="en-US" smtClean="0"/>
               <a:pPr/>
-              <a:t>2022-12-27</a:t>
+              <a:t>2022-12-29</a:t>
             </a:fld>
             <a:endParaRPr lang="ko-KR" altLang="en-US"/>
           </a:p>
@@ -639,7 +644,7 @@
             <a:fld id="{F74D16A0-72E3-4062-88A7-C275730AB40C}" type="datetimeFigureOut">
               <a:rPr lang="ko-KR" altLang="en-US" smtClean="0"/>
               <a:pPr/>
-              <a:t>2022-12-27</a:t>
+              <a:t>2022-12-29</a:t>
             </a:fld>
             <a:endParaRPr lang="ko-KR" altLang="en-US"/>
           </a:p>
@@ -806,7 +811,7 @@
             <a:fld id="{F74D16A0-72E3-4062-88A7-C275730AB40C}" type="datetimeFigureOut">
               <a:rPr lang="ko-KR" altLang="en-US" smtClean="0"/>
               <a:pPr/>
-              <a:t>2022-12-27</a:t>
+              <a:t>2022-12-29</a:t>
             </a:fld>
             <a:endParaRPr lang="ko-KR" altLang="en-US"/>
           </a:p>
@@ -1049,7 +1054,7 @@
             <a:fld id="{F74D16A0-72E3-4062-88A7-C275730AB40C}" type="datetimeFigureOut">
               <a:rPr lang="ko-KR" altLang="en-US" smtClean="0"/>
               <a:pPr/>
-              <a:t>2022-12-27</a:t>
+              <a:t>2022-12-29</a:t>
             </a:fld>
             <a:endParaRPr lang="ko-KR" altLang="en-US"/>
           </a:p>
@@ -1334,7 +1339,7 @@
             <a:fld id="{F74D16A0-72E3-4062-88A7-C275730AB40C}" type="datetimeFigureOut">
               <a:rPr lang="ko-KR" altLang="en-US" smtClean="0"/>
               <a:pPr/>
-              <a:t>2022-12-27</a:t>
+              <a:t>2022-12-29</a:t>
             </a:fld>
             <a:endParaRPr lang="ko-KR" altLang="en-US"/>
           </a:p>
@@ -1753,7 +1758,7 @@
             <a:fld id="{F74D16A0-72E3-4062-88A7-C275730AB40C}" type="datetimeFigureOut">
               <a:rPr lang="ko-KR" altLang="en-US" smtClean="0"/>
               <a:pPr/>
-              <a:t>2022-12-27</a:t>
+              <a:t>2022-12-29</a:t>
             </a:fld>
             <a:endParaRPr lang="ko-KR" altLang="en-US"/>
           </a:p>
@@ -1868,7 +1873,7 @@
             <a:fld id="{F74D16A0-72E3-4062-88A7-C275730AB40C}" type="datetimeFigureOut">
               <a:rPr lang="ko-KR" altLang="en-US" smtClean="0"/>
               <a:pPr/>
-              <a:t>2022-12-27</a:t>
+              <a:t>2022-12-29</a:t>
             </a:fld>
             <a:endParaRPr lang="ko-KR" altLang="en-US"/>
           </a:p>
@@ -1960,7 +1965,7 @@
             <a:fld id="{F74D16A0-72E3-4062-88A7-C275730AB40C}" type="datetimeFigureOut">
               <a:rPr lang="ko-KR" altLang="en-US" smtClean="0"/>
               <a:pPr/>
-              <a:t>2022-12-27</a:t>
+              <a:t>2022-12-29</a:t>
             </a:fld>
             <a:endParaRPr lang="ko-KR" altLang="en-US"/>
           </a:p>
@@ -2234,7 +2239,7 @@
             <a:fld id="{F74D16A0-72E3-4062-88A7-C275730AB40C}" type="datetimeFigureOut">
               <a:rPr lang="ko-KR" altLang="en-US" smtClean="0"/>
               <a:pPr/>
-              <a:t>2022-12-27</a:t>
+              <a:t>2022-12-29</a:t>
             </a:fld>
             <a:endParaRPr lang="ko-KR" altLang="en-US"/>
           </a:p>
@@ -2484,7 +2489,7 @@
             <a:fld id="{F74D16A0-72E3-4062-88A7-C275730AB40C}" type="datetimeFigureOut">
               <a:rPr lang="ko-KR" altLang="en-US" smtClean="0"/>
               <a:pPr/>
-              <a:t>2022-12-27</a:t>
+              <a:t>2022-12-29</a:t>
             </a:fld>
             <a:endParaRPr lang="ko-KR" altLang="en-US"/>
           </a:p>
@@ -2694,7 +2699,7 @@
             <a:fld id="{F74D16A0-72E3-4062-88A7-C275730AB40C}" type="datetimeFigureOut">
               <a:rPr lang="ko-KR" altLang="en-US" smtClean="0"/>
               <a:pPr/>
-              <a:t>2022-12-27</a:t>
+              <a:t>2022-12-29</a:t>
             </a:fld>
             <a:endParaRPr lang="ko-KR" altLang="en-US"/>
           </a:p>
@@ -3084,11 +3089,7 @@
           <a:p>
             <a:r>
               <a:rPr lang="en-US" altLang="ko-KR" sz="2800" b="1" dirty="0" smtClean="0"/>
-              <a:t>Raspberry </a:t>
-            </a:r>
-            <a:r>
-              <a:rPr lang="en-US" altLang="ko-KR" sz="2800" b="1" dirty="0" smtClean="0"/>
-              <a:t>Pi</a:t>
+              <a:t>Raspberry Pi</a:t>
             </a:r>
             <a:r>
               <a:rPr lang="ko-KR" altLang="en-US" sz="2800" b="1" dirty="0" smtClean="0"/>
@@ -3096,11 +3097,7 @@
             </a:r>
             <a:r>
               <a:rPr lang="en-US" altLang="ko-KR" sz="2800" b="1" dirty="0" smtClean="0"/>
-              <a:t>4 + </a:t>
-            </a:r>
-            <a:r>
-              <a:rPr lang="en-US" altLang="ko-KR" sz="2800" b="1" dirty="0" smtClean="0"/>
-              <a:t>NCS 2 Setup</a:t>
+              <a:t>4 + NCS 2 Setup</a:t>
             </a:r>
             <a:endParaRPr lang="ko-KR" altLang="en-US" sz="2800" b="1" dirty="0"/>
           </a:p>
@@ -3119,7 +3116,7 @@
         <p:spPr>
           <a:xfrm>
             <a:off x="457200" y="1428736"/>
-            <a:ext cx="8229600" cy="5214974"/>
+            <a:ext cx="8472518" cy="5214974"/>
           </a:xfrm>
         </p:spPr>
         <p:txBody>
@@ -3151,16 +3148,13 @@
             </a:r>
             <a:r>
               <a:rPr lang="en-US" altLang="ko-KR" sz="2400" b="1" dirty="0" smtClean="0"/>
-              <a:t> OS 10 (Buster) + </a:t>
-            </a:r>
-            <a:r>
-              <a:rPr lang="en-US" altLang="ko-KR" sz="2400" b="1" dirty="0" err="1" smtClean="0"/>
-              <a:t>OpenVINO</a:t>
+              <a:t> OS 10 (Buster) + OpenVINO </a:t>
             </a:r>
             <a:r>
               <a:rPr lang="en-US" altLang="ko-KR" sz="2400" b="1" dirty="0" smtClean="0"/>
-              <a:t> 2021.4</a:t>
-            </a:r>
+              <a:t>2021.4.2</a:t>
+            </a:r>
+            <a:endParaRPr lang="en-US" altLang="ko-KR" sz="2400" b="1" dirty="0" smtClean="0"/>
           </a:p>
           <a:p>
             <a:pPr marL="628650" indent="-266700">
@@ -3249,11 +3243,7 @@
             </a:r>
             <a:r>
               <a:rPr lang="en-US" altLang="ko-KR" sz="1800" dirty="0" smtClean="0"/>
-              <a:t>Intel </a:t>
-            </a:r>
-            <a:r>
-              <a:rPr lang="en-US" altLang="ko-KR" sz="1800" dirty="0" err="1" smtClean="0"/>
-              <a:t>OpenVINO</a:t>
+              <a:t>Intel OpenVINO</a:t>
             </a:r>
             <a:r>
               <a:rPr lang="ko-KR" altLang="en-US" sz="1800" dirty="0" smtClean="0"/>
@@ -3312,12 +3302,12 @@
               <a:t>를 사용하기 위해서는 </a:t>
             </a:r>
             <a:r>
-              <a:rPr lang="en-US" altLang="ko-KR" sz="1800" dirty="0" err="1" smtClean="0"/>
-              <a:t>OpenVINO</a:t>
-            </a:r>
-            <a:r>
               <a:rPr lang="en-US" altLang="ko-KR" sz="1800" dirty="0" smtClean="0"/>
-              <a:t> 2021.4 </a:t>
+              <a:t>OpenVINO </a:t>
+            </a:r>
+            <a:r>
+              <a:rPr lang="en-US" altLang="ko-KR" sz="1800" dirty="0" smtClean="0"/>
+              <a:t>2021.4.2 </a:t>
             </a:r>
             <a:r>
               <a:rPr lang="ko-KR" altLang="en-US" sz="1800" dirty="0" smtClean="0"/>
@@ -3325,15 +3315,7 @@
             </a:r>
             <a:r>
               <a:rPr lang="en-US" altLang="ko-KR" sz="1800" dirty="0" smtClean="0"/>
-              <a:t>(</a:t>
-            </a:r>
-            <a:r>
-              <a:rPr lang="en-US" altLang="ko-KR" sz="1800" dirty="0" err="1" smtClean="0"/>
-              <a:t>OpenVINO</a:t>
-            </a:r>
-            <a:r>
-              <a:rPr lang="en-US" altLang="ko-KR" sz="1800" dirty="0" smtClean="0"/>
-              <a:t> 2021.4</a:t>
+              <a:t>(OpenVINO 2021.4</a:t>
             </a:r>
             <a:r>
               <a:rPr lang="ko-KR" altLang="en-US" sz="1800" dirty="0" smtClean="0"/>
@@ -3379,16 +3361,20 @@
               </a:tabLst>
             </a:pPr>
             <a:r>
-              <a:rPr lang="en-US" altLang="ko-KR" sz="1800" dirty="0" err="1" smtClean="0"/>
-              <a:t>OpenVINO</a:t>
-            </a:r>
-            <a:r>
               <a:rPr lang="en-US" altLang="ko-KR" sz="1800" dirty="0" smtClean="0"/>
-              <a:t> 2021.4</a:t>
+              <a:t>OpenVINO </a:t>
+            </a:r>
+            <a:r>
+              <a:rPr lang="en-US" altLang="ko-KR" sz="1800" dirty="0" smtClean="0"/>
+              <a:t>2021.4.2</a:t>
             </a:r>
             <a:r>
               <a:rPr lang="ko-KR" altLang="en-US" sz="1800" dirty="0" smtClean="0"/>
-              <a:t>는 구형 </a:t>
+              <a:t>는 </a:t>
+            </a:r>
+            <a:r>
+              <a:rPr lang="ko-KR" altLang="en-US" sz="1800" dirty="0" smtClean="0"/>
+              <a:t>구형 </a:t>
             </a:r>
             <a:r>
               <a:rPr lang="en-US" altLang="ko-KR" sz="1800" dirty="0" err="1" smtClean="0"/>
@@ -3400,11 +3386,7 @@
             </a:r>
             <a:r>
               <a:rPr lang="ko-KR" altLang="en-US" sz="1800" dirty="0" smtClean="0"/>
-              <a:t> </a:t>
-            </a:r>
-            <a:r>
-              <a:rPr lang="ko-KR" altLang="en-US" sz="1800" dirty="0" smtClean="0"/>
-              <a:t>환경에서 검증됨</a:t>
+              <a:t> 환경에서 검증됨</a:t>
             </a:r>
             <a:endParaRPr lang="en-US" altLang="ko-KR" sz="1800" dirty="0" smtClean="0"/>
           </a:p>
@@ -3443,20 +3425,12 @@
               <a:t>를 지원하는 </a:t>
             </a:r>
             <a:r>
-              <a:rPr lang="en-US" altLang="ko-KR" sz="1800" dirty="0" err="1" smtClean="0"/>
-              <a:t>OpenVINO</a:t>
-            </a:r>
-            <a:r>
               <a:rPr lang="en-US" altLang="ko-KR" sz="1800" dirty="0" smtClean="0"/>
-              <a:t> Runtime</a:t>
+              <a:t>OpenVINO Runtime</a:t>
             </a:r>
             <a:r>
               <a:rPr lang="ko-KR" altLang="en-US" sz="1800" dirty="0" smtClean="0"/>
-              <a:t>은</a:t>
-            </a:r>
-            <a:r>
-              <a:rPr lang="ko-KR" altLang="en-US" sz="1800" dirty="0" smtClean="0"/>
-              <a:t> </a:t>
+              <a:t>은 </a:t>
             </a:r>
             <a:r>
               <a:rPr lang="en-US" altLang="ko-KR" sz="1800" dirty="0" smtClean="0"/>
@@ -3506,6 +3480,1205 @@
               <a:rPr lang="ko-KR" altLang="en-US" sz="1800" dirty="0" smtClean="0"/>
               <a:t>만 사용할 수 있음</a:t>
             </a:r>
+            <a:endParaRPr lang="en-US" altLang="ko-KR" sz="2400" b="1" dirty="0" smtClean="0"/>
+          </a:p>
+        </p:txBody>
+      </p:sp>
+      <p:sp>
+        <p:nvSpPr>
+          <p:cNvPr id="6" name="TextBox 5"/>
+          <p:cNvSpPr txBox="1"/>
+          <p:nvPr/>
+        </p:nvSpPr>
+        <p:spPr>
+          <a:xfrm>
+            <a:off x="7215206" y="785794"/>
+            <a:ext cx="1632178" cy="276999"/>
+          </a:xfrm>
+          <a:prstGeom prst="rect">
+            <a:avLst/>
+          </a:prstGeom>
+          <a:noFill/>
+        </p:spPr>
+        <p:txBody>
+          <a:bodyPr wrap="none" rtlCol="0">
+            <a:spAutoFit/>
+          </a:bodyPr>
+          <a:lstStyle/>
+          <a:p>
+            <a:r>
+              <a:rPr lang="en-US" altLang="ko-KR" sz="1200" b="1" dirty="0" smtClean="0">
+                <a:solidFill>
+                  <a:srgbClr val="00B050"/>
+                </a:solidFill>
+                <a:latin typeface="맑은 고딕"/>
+                <a:ea typeface="맑은 고딕"/>
+              </a:rPr>
+              <a:t>※ </a:t>
+            </a:r>
+            <a:r>
+              <a:rPr lang="en-US" altLang="ko-KR" sz="1200" b="1" dirty="0" smtClean="0">
+                <a:solidFill>
+                  <a:srgbClr val="00B050"/>
+                </a:solidFill>
+              </a:rPr>
+              <a:t>2022. 12. 27 </a:t>
+            </a:r>
+            <a:r>
+              <a:rPr lang="ko-KR" altLang="en-US" sz="1200" b="1" dirty="0" smtClean="0">
+                <a:solidFill>
+                  <a:srgbClr val="00B050"/>
+                </a:solidFill>
+              </a:rPr>
+              <a:t>기준</a:t>
+            </a:r>
+            <a:endParaRPr lang="ko-KR" altLang="en-US" sz="1200" b="1" dirty="0">
+              <a:solidFill>
+                <a:srgbClr val="00B050"/>
+              </a:solidFill>
+            </a:endParaRPr>
+          </a:p>
+        </p:txBody>
+      </p:sp>
+    </p:spTree>
+  </p:cSld>
+  <p:clrMapOvr>
+    <a:masterClrMapping/>
+  </p:clrMapOvr>
+</p:sld>
+</file>
+
+<file path=ppt/slides/slide10.xml><?xml version="1.0" encoding="utf-8"?>
+<p:sld xmlns:a="http://schemas.openxmlformats.org/drawingml/2006/main" xmlns:r="http://schemas.openxmlformats.org/officeDocument/2006/relationships" xmlns:p="http://schemas.openxmlformats.org/presentationml/2006/main">
+  <p:cSld>
+    <p:spTree>
+      <p:nvGrpSpPr>
+        <p:cNvPr id="1" name=""/>
+        <p:cNvGrpSpPr/>
+        <p:nvPr/>
+      </p:nvGrpSpPr>
+      <p:grpSpPr>
+        <a:xfrm>
+          <a:off x="0" y="0"/>
+          <a:ext cx="0" cy="0"/>
+          <a:chOff x="0" y="0"/>
+          <a:chExt cx="0" cy="0"/>
+        </a:xfrm>
+      </p:grpSpPr>
+      <p:sp>
+        <p:nvSpPr>
+          <p:cNvPr id="4" name="Title 3"/>
+          <p:cNvSpPr>
+            <a:spLocks noGrp="1"/>
+          </p:cNvSpPr>
+          <p:nvPr>
+            <p:ph type="title"/>
+          </p:nvPr>
+        </p:nvSpPr>
+        <p:spPr/>
+        <p:txBody>
+          <a:bodyPr>
+            <a:noAutofit/>
+          </a:bodyPr>
+          <a:lstStyle/>
+          <a:p>
+            <a:r>
+              <a:rPr lang="en-US" altLang="ko-KR" sz="2800" b="1" dirty="0" smtClean="0"/>
+              <a:t>Raspberry Pi</a:t>
+            </a:r>
+            <a:r>
+              <a:rPr lang="ko-KR" altLang="en-US" sz="2800" b="1" dirty="0" smtClean="0"/>
+              <a:t> </a:t>
+            </a:r>
+            <a:r>
+              <a:rPr lang="en-US" altLang="ko-KR" sz="2800" b="1" dirty="0" smtClean="0"/>
+              <a:t>+ NCS Setup</a:t>
+            </a:r>
+            <a:endParaRPr lang="ko-KR" altLang="en-US" sz="2800" b="1" dirty="0"/>
+          </a:p>
+        </p:txBody>
+      </p:sp>
+      <p:sp>
+        <p:nvSpPr>
+          <p:cNvPr id="5" name="Content Placeholder 4"/>
+          <p:cNvSpPr>
+            <a:spLocks noGrp="1"/>
+          </p:cNvSpPr>
+          <p:nvPr>
+            <p:ph idx="1"/>
+          </p:nvPr>
+        </p:nvSpPr>
+        <p:spPr>
+          <a:xfrm>
+            <a:off x="457200" y="1142984"/>
+            <a:ext cx="8401080" cy="5214974"/>
+          </a:xfrm>
+        </p:spPr>
+        <p:txBody>
+          <a:bodyPr>
+            <a:noAutofit/>
+          </a:bodyPr>
+          <a:lstStyle/>
+          <a:p>
+            <a:pPr marL="450850" indent="-450850">
+              <a:lnSpc>
+                <a:spcPct val="150000"/>
+              </a:lnSpc>
+              <a:spcBef>
+                <a:spcPts val="100"/>
+              </a:spcBef>
+              <a:buNone/>
+            </a:pPr>
+            <a:r>
+              <a:rPr lang="en-US" altLang="ko-KR" sz="2400" b="1" dirty="0" smtClean="0"/>
+              <a:t>[</a:t>
+            </a:r>
+            <a:r>
+              <a:rPr lang="ko-KR" altLang="en-US" sz="2400" b="1" dirty="0" smtClean="0"/>
+              <a:t>방안 </a:t>
+            </a:r>
+            <a:r>
+              <a:rPr lang="en-US" altLang="ko-KR" sz="2400" b="1" dirty="0" smtClean="0"/>
+              <a:t>1 : </a:t>
+            </a:r>
+            <a:r>
+              <a:rPr lang="en-US" altLang="ko-KR" sz="2400" b="1" dirty="0" err="1" smtClean="0"/>
+              <a:t>Raspbian</a:t>
+            </a:r>
+            <a:r>
+              <a:rPr lang="en-US" altLang="ko-KR" sz="2400" b="1" dirty="0" smtClean="0"/>
+              <a:t> OS 10 (Buster) + OpenVINO </a:t>
+            </a:r>
+            <a:r>
+              <a:rPr lang="en-US" altLang="ko-KR" sz="2400" b="1" dirty="0" smtClean="0"/>
+              <a:t>2021.4.2]</a:t>
+            </a:r>
+            <a:endParaRPr lang="en-US" altLang="ko-KR" sz="2400" dirty="0" smtClean="0"/>
+          </a:p>
+          <a:p>
+            <a:pPr marL="457200" indent="-457200">
+              <a:lnSpc>
+                <a:spcPct val="150000"/>
+              </a:lnSpc>
+              <a:spcBef>
+                <a:spcPts val="100"/>
+              </a:spcBef>
+              <a:buFont typeface="+mj-lt"/>
+              <a:buAutoNum type="arabicParenR" startAt="2"/>
+            </a:pPr>
+            <a:r>
+              <a:rPr lang="en-US" altLang="ko-KR" sz="2400" dirty="0" smtClean="0"/>
+              <a:t>OpenVINO 2021.4 Runtime </a:t>
+            </a:r>
+            <a:r>
+              <a:rPr lang="ko-KR" altLang="en-US" sz="2400" dirty="0" smtClean="0"/>
+              <a:t>설치</a:t>
+            </a:r>
+            <a:endParaRPr lang="en-US" altLang="ko-KR" sz="2400" dirty="0" smtClean="0"/>
+          </a:p>
+        </p:txBody>
+      </p:sp>
+      <p:sp>
+        <p:nvSpPr>
+          <p:cNvPr id="7" name="TextBox 6"/>
+          <p:cNvSpPr txBox="1"/>
+          <p:nvPr/>
+        </p:nvSpPr>
+        <p:spPr>
+          <a:xfrm>
+            <a:off x="7215206" y="785794"/>
+            <a:ext cx="1632178" cy="276999"/>
+          </a:xfrm>
+          <a:prstGeom prst="rect">
+            <a:avLst/>
+          </a:prstGeom>
+          <a:noFill/>
+        </p:spPr>
+        <p:txBody>
+          <a:bodyPr wrap="none" rtlCol="0">
+            <a:spAutoFit/>
+          </a:bodyPr>
+          <a:lstStyle/>
+          <a:p>
+            <a:r>
+              <a:rPr lang="en-US" altLang="ko-KR" sz="1200" b="1" dirty="0" smtClean="0">
+                <a:solidFill>
+                  <a:srgbClr val="00B050"/>
+                </a:solidFill>
+                <a:latin typeface="맑은 고딕"/>
+                <a:ea typeface="맑은 고딕"/>
+              </a:rPr>
+              <a:t>※ </a:t>
+            </a:r>
+            <a:r>
+              <a:rPr lang="en-US" altLang="ko-KR" sz="1200" b="1" dirty="0" smtClean="0">
+                <a:solidFill>
+                  <a:srgbClr val="00B050"/>
+                </a:solidFill>
+              </a:rPr>
+              <a:t>2022. 12. 27 </a:t>
+            </a:r>
+            <a:r>
+              <a:rPr lang="ko-KR" altLang="en-US" sz="1200" b="1" dirty="0" smtClean="0">
+                <a:solidFill>
+                  <a:srgbClr val="00B050"/>
+                </a:solidFill>
+              </a:rPr>
+              <a:t>기준</a:t>
+            </a:r>
+            <a:endParaRPr lang="ko-KR" altLang="en-US" sz="1200" b="1" dirty="0">
+              <a:solidFill>
+                <a:srgbClr val="00B050"/>
+              </a:solidFill>
+            </a:endParaRPr>
+          </a:p>
+        </p:txBody>
+      </p:sp>
+      <p:sp>
+        <p:nvSpPr>
+          <p:cNvPr id="12" name="TextBox 11"/>
+          <p:cNvSpPr txBox="1"/>
+          <p:nvPr/>
+        </p:nvSpPr>
+        <p:spPr>
+          <a:xfrm>
+            <a:off x="1000100" y="2500306"/>
+            <a:ext cx="7858180" cy="4278094"/>
+          </a:xfrm>
+          <a:prstGeom prst="rect">
+            <a:avLst/>
+          </a:prstGeom>
+          <a:noFill/>
+        </p:spPr>
+        <p:txBody>
+          <a:bodyPr wrap="square" rtlCol="0">
+            <a:spAutoFit/>
+          </a:bodyPr>
+          <a:lstStyle/>
+          <a:p>
+            <a:pPr marL="450850" indent="-450850">
+              <a:buFont typeface="Wingdings" pitchFamily="2" charset="2"/>
+              <a:buAutoNum type="arabicParenBoth" startAt="12"/>
+            </a:pPr>
+            <a:r>
+              <a:rPr lang="en-US" altLang="ko-KR" sz="1600" b="1" dirty="0" smtClean="0"/>
+              <a:t>source ./bin/</a:t>
+            </a:r>
+            <a:r>
+              <a:rPr lang="en-US" altLang="ko-KR" sz="1600" b="1" dirty="0" err="1" smtClean="0"/>
+              <a:t>setupvars.h</a:t>
+            </a:r>
+            <a:endParaRPr lang="en-US" altLang="ko-KR" sz="1600" b="1" dirty="0" smtClean="0"/>
+          </a:p>
+          <a:p>
+            <a:pPr marL="450850" indent="-450850"/>
+            <a:r>
+              <a:rPr lang="en-US" altLang="ko-KR" sz="1600" dirty="0" smtClean="0"/>
+              <a:t>      : </a:t>
+            </a:r>
+            <a:r>
+              <a:rPr lang="ko-KR" altLang="en-US" sz="1600" dirty="0" smtClean="0"/>
+              <a:t>환경변수 적용 → 시스템 및 터미널 실행 시 자동 적용하기 위해</a:t>
+            </a:r>
+            <a:r>
+              <a:rPr lang="ko-KR" altLang="en-US" sz="1600" dirty="0" smtClean="0"/>
+              <a:t>서</a:t>
+            </a:r>
+            <a:r>
+              <a:rPr lang="ko-KR" altLang="en-US" sz="1600" dirty="0" smtClean="0"/>
+              <a:t>는 </a:t>
+            </a:r>
+            <a:r>
+              <a:rPr lang="en-US" altLang="ko-KR" sz="1600" dirty="0" smtClean="0"/>
+              <a:t>.</a:t>
+            </a:r>
+            <a:r>
+              <a:rPr lang="en-US" altLang="ko-KR" sz="1600" dirty="0" err="1" smtClean="0"/>
+              <a:t>bashrc</a:t>
+            </a:r>
+            <a:r>
+              <a:rPr lang="ko-KR" altLang="en-US" sz="1600" dirty="0" smtClean="0"/>
+              <a:t>에 </a:t>
+            </a:r>
+            <a:r>
+              <a:rPr lang="en-US" altLang="ko-KR" sz="1600" dirty="0" smtClean="0"/>
+              <a:t>“source /home/&lt;USER&gt;/</a:t>
+            </a:r>
+            <a:r>
+              <a:rPr lang="en-US" altLang="ko-KR" sz="1600" dirty="0" err="1" smtClean="0"/>
+              <a:t>intel</a:t>
+            </a:r>
+            <a:r>
+              <a:rPr lang="en-US" altLang="ko-KR" sz="1600" dirty="0" smtClean="0"/>
+              <a:t>/bin/setupvars.sh” </a:t>
+            </a:r>
+            <a:r>
+              <a:rPr lang="ko-KR" altLang="en-US" sz="1600" dirty="0" smtClean="0"/>
+              <a:t>추가</a:t>
+            </a:r>
+            <a:endParaRPr lang="en-US" altLang="ko-KR" sz="1600" dirty="0" smtClean="0"/>
+          </a:p>
+          <a:p>
+            <a:pPr marL="450850" indent="-450850">
+              <a:buAutoNum type="arabicParenBoth" startAt="12"/>
+            </a:pPr>
+            <a:endParaRPr lang="en-US" altLang="ko-KR" sz="1600" dirty="0" smtClean="0"/>
+          </a:p>
+          <a:p>
+            <a:pPr marL="450850" indent="-450850">
+              <a:buAutoNum type="arabicParenBoth" startAt="12"/>
+            </a:pPr>
+            <a:endParaRPr lang="en-US" altLang="ko-KR" sz="1600" dirty="0" smtClean="0"/>
+          </a:p>
+          <a:p>
+            <a:pPr marL="450850" indent="-450850">
+              <a:buFont typeface="Wingdings" pitchFamily="2" charset="2"/>
+              <a:buAutoNum type="arabicParenBoth" startAt="13"/>
+            </a:pPr>
+            <a:r>
+              <a:rPr lang="en-US" altLang="ko-KR" sz="1600" b="1" dirty="0" smtClean="0"/>
+              <a:t>[</a:t>
+            </a:r>
+            <a:r>
+              <a:rPr lang="en-US" altLang="ko-KR" sz="1600" b="1" dirty="0" smtClean="0"/>
+              <a:t>setupvars.sh] OpenVINO environment </a:t>
+            </a:r>
+            <a:r>
+              <a:rPr lang="en-US" altLang="ko-KR" sz="1600" b="1" dirty="0" smtClean="0"/>
+              <a:t>initialized </a:t>
+            </a:r>
+            <a:r>
+              <a:rPr lang="ko-KR" altLang="en-US" sz="1600" b="1" dirty="0" smtClean="0"/>
+              <a:t>확인</a:t>
+            </a:r>
+            <a:endParaRPr lang="en-US" altLang="ko-KR" sz="1600" b="1" dirty="0" smtClean="0"/>
+          </a:p>
+          <a:p>
+            <a:pPr marL="450850" indent="-450850">
+              <a:buAutoNum type="arabicParenBoth" startAt="13"/>
+            </a:pPr>
+            <a:endParaRPr lang="en-US" altLang="ko-KR" sz="1600" dirty="0" smtClean="0"/>
+          </a:p>
+          <a:p>
+            <a:pPr marL="450850" indent="-450850">
+              <a:buAutoNum type="arabicParenBoth" startAt="13"/>
+            </a:pPr>
+            <a:r>
+              <a:rPr lang="en-US" altLang="ko-KR" sz="1600" b="1" dirty="0" smtClean="0"/>
+              <a:t>sudo </a:t>
+            </a:r>
+            <a:r>
+              <a:rPr lang="en-US" altLang="ko-KR" sz="1600" b="1" dirty="0" err="1" smtClean="0"/>
+              <a:t>usermod</a:t>
+            </a:r>
+            <a:r>
+              <a:rPr lang="en-US" altLang="ko-KR" sz="1600" b="1" dirty="0" smtClean="0"/>
+              <a:t> -a -G users “$(</a:t>
+            </a:r>
+            <a:r>
+              <a:rPr lang="en-US" altLang="ko-KR" sz="1600" b="1" dirty="0" err="1" smtClean="0"/>
+              <a:t>whoami</a:t>
+            </a:r>
+            <a:r>
+              <a:rPr lang="en-US" altLang="ko-KR" sz="1600" b="1" dirty="0" smtClean="0"/>
+              <a:t>)” </a:t>
+            </a:r>
+            <a:r>
+              <a:rPr lang="en-US" altLang="ko-KR" sz="1600" dirty="0" smtClean="0"/>
+              <a:t>: user </a:t>
+            </a:r>
+            <a:r>
+              <a:rPr lang="ko-KR" altLang="en-US" sz="1600" dirty="0" smtClean="0"/>
+              <a:t>그룹에 현재 유저 추가</a:t>
+            </a:r>
+            <a:endParaRPr lang="en-US" altLang="ko-KR" sz="1600" dirty="0" smtClean="0"/>
+          </a:p>
+          <a:p>
+            <a:pPr marL="450850" indent="-450850">
+              <a:buAutoNum type="arabicParenBoth" startAt="13"/>
+            </a:pPr>
+            <a:endParaRPr lang="en-US" altLang="ko-KR" sz="1600" dirty="0" smtClean="0"/>
+          </a:p>
+          <a:p>
+            <a:pPr marL="450850" indent="-450850">
+              <a:buAutoNum type="arabicParenBoth" startAt="13"/>
+            </a:pPr>
+            <a:r>
+              <a:rPr lang="en-US" altLang="ko-KR" sz="1600" b="1" dirty="0" smtClean="0"/>
+              <a:t>sudo -E ./</a:t>
+            </a:r>
+            <a:r>
+              <a:rPr lang="en-US" altLang="ko-KR" sz="1600" b="1" dirty="0" err="1" smtClean="0"/>
+              <a:t>install_dependencies</a:t>
+            </a:r>
+            <a:r>
+              <a:rPr lang="en-US" altLang="ko-KR" sz="1600" b="1" dirty="0" smtClean="0"/>
+              <a:t>/install_NCS_udev_rules.sh</a:t>
+            </a:r>
+          </a:p>
+          <a:p>
+            <a:pPr marL="450850" indent="-450850"/>
+            <a:r>
+              <a:rPr lang="en-US" altLang="ko-KR" sz="1600" dirty="0" smtClean="0"/>
+              <a:t> </a:t>
+            </a:r>
+            <a:r>
+              <a:rPr lang="en-US" altLang="ko-KR" sz="1600" dirty="0" smtClean="0"/>
+              <a:t>     : NCS2 </a:t>
+            </a:r>
+            <a:r>
+              <a:rPr lang="ko-KR" altLang="en-US" sz="1600" dirty="0" smtClean="0"/>
+              <a:t>관련 </a:t>
+            </a:r>
+            <a:r>
+              <a:rPr lang="en-US" altLang="ko-KR" sz="1600" dirty="0" smtClean="0"/>
+              <a:t>USB rule </a:t>
+            </a:r>
+            <a:r>
+              <a:rPr lang="ko-KR" altLang="en-US" sz="1600" dirty="0" smtClean="0"/>
+              <a:t>적용 </a:t>
+            </a:r>
+            <a:r>
+              <a:rPr lang="en-US" altLang="ko-KR" sz="1600" dirty="0" smtClean="0"/>
+              <a:t>/ NCS2</a:t>
+            </a:r>
+            <a:r>
+              <a:rPr lang="ko-KR" altLang="en-US" sz="1600" dirty="0" smtClean="0"/>
+              <a:t>가 제대로 시스템에 인식되게함</a:t>
+            </a:r>
+            <a:endParaRPr lang="en-US" altLang="ko-KR" sz="1600" dirty="0" smtClean="0"/>
+          </a:p>
+          <a:p>
+            <a:pPr marL="450850" indent="-450850">
+              <a:buAutoNum type="arabicParenBoth" startAt="13"/>
+            </a:pPr>
+            <a:endParaRPr lang="en-US" altLang="ko-KR" sz="1600" dirty="0" smtClean="0"/>
+          </a:p>
+          <a:p>
+            <a:pPr marL="450850" indent="-450850">
+              <a:buFont typeface="Wingdings" pitchFamily="2" charset="2"/>
+              <a:buAutoNum type="arabicParenBoth" startAt="16"/>
+            </a:pPr>
+            <a:r>
+              <a:rPr lang="en-US" altLang="ko-KR" sz="1600" b="1" dirty="0" smtClean="0"/>
+              <a:t>Udev </a:t>
+            </a:r>
+            <a:r>
+              <a:rPr lang="en-US" altLang="ko-KR" sz="1600" b="1" dirty="0" smtClean="0"/>
+              <a:t>rules have been successfully installed</a:t>
+            </a:r>
+            <a:r>
+              <a:rPr lang="en-US" altLang="ko-KR" sz="1600" b="1" dirty="0" smtClean="0"/>
+              <a:t>. </a:t>
+            </a:r>
+            <a:r>
+              <a:rPr lang="ko-KR" altLang="en-US" sz="1600" b="1" dirty="0" smtClean="0"/>
+              <a:t>확인</a:t>
+            </a:r>
+            <a:endParaRPr lang="en-US" altLang="ko-KR" sz="1600" b="1" dirty="0" smtClean="0"/>
+          </a:p>
+          <a:p>
+            <a:pPr marL="450850" indent="-450850">
+              <a:buAutoNum type="arabicParenBoth" startAt="16"/>
+            </a:pPr>
+            <a:endParaRPr lang="en-US" altLang="ko-KR" sz="1600" dirty="0" smtClean="0"/>
+          </a:p>
+          <a:p>
+            <a:pPr marL="450850" indent="-450850">
+              <a:buAutoNum type="arabicParenBoth" startAt="16"/>
+            </a:pPr>
+            <a:endParaRPr lang="en-US" altLang="ko-KR" sz="1600" dirty="0" smtClean="0"/>
+          </a:p>
+          <a:p>
+            <a:pPr marL="450850" indent="-450850">
+              <a:buAutoNum type="arabicParenBoth" startAt="16"/>
+            </a:pPr>
+            <a:endParaRPr lang="en-US" altLang="ko-KR" sz="1600" dirty="0" smtClean="0"/>
+          </a:p>
+          <a:p>
+            <a:pPr marL="450850" indent="-450850">
+              <a:buAutoNum type="arabicParenBoth" startAt="16"/>
+            </a:pPr>
+            <a:r>
+              <a:rPr lang="en-US" altLang="ko-KR" sz="1600" b="1" dirty="0" smtClean="0"/>
+              <a:t>Intel NCS2 USB</a:t>
+            </a:r>
+            <a:r>
+              <a:rPr lang="ko-KR" altLang="en-US" sz="1600" b="1" dirty="0" smtClean="0"/>
+              <a:t>에 연결</a:t>
+            </a:r>
+            <a:endParaRPr lang="en-US" altLang="ko-KR" sz="1600" b="1" dirty="0" smtClean="0"/>
+          </a:p>
+        </p:txBody>
+      </p:sp>
+      <p:pic>
+        <p:nvPicPr>
+          <p:cNvPr id="3074" name="Picture 2"/>
+          <p:cNvPicPr>
+            <a:picLocks noChangeAspect="1" noChangeArrowheads="1"/>
+          </p:cNvPicPr>
+          <p:nvPr/>
+        </p:nvPicPr>
+        <p:blipFill>
+          <a:blip r:embed="rId2"/>
+          <a:srcRect/>
+          <a:stretch>
+            <a:fillRect/>
+          </a:stretch>
+        </p:blipFill>
+        <p:spPr bwMode="auto">
+          <a:xfrm>
+            <a:off x="1071538" y="5857892"/>
+            <a:ext cx="7632700" cy="469900"/>
+          </a:xfrm>
+          <a:prstGeom prst="rect">
+            <a:avLst/>
+          </a:prstGeom>
+          <a:noFill/>
+          <a:ln w="9525">
+            <a:noFill/>
+            <a:miter lim="800000"/>
+            <a:headEnd/>
+            <a:tailEnd/>
+          </a:ln>
+          <a:effectLst/>
+        </p:spPr>
+      </p:pic>
+      <p:pic>
+        <p:nvPicPr>
+          <p:cNvPr id="3075" name="Picture 3"/>
+          <p:cNvPicPr>
+            <a:picLocks noChangeAspect="1" noChangeArrowheads="1"/>
+          </p:cNvPicPr>
+          <p:nvPr/>
+        </p:nvPicPr>
+        <p:blipFill>
+          <a:blip r:embed="rId3"/>
+          <a:srcRect/>
+          <a:stretch>
+            <a:fillRect/>
+          </a:stretch>
+        </p:blipFill>
+        <p:spPr bwMode="auto">
+          <a:xfrm>
+            <a:off x="1571604" y="3357562"/>
+            <a:ext cx="6315091" cy="357171"/>
+          </a:xfrm>
+          <a:prstGeom prst="rect">
+            <a:avLst/>
+          </a:prstGeom>
+          <a:noFill/>
+          <a:ln w="9525">
+            <a:noFill/>
+            <a:miter lim="800000"/>
+            <a:headEnd/>
+            <a:tailEnd/>
+          </a:ln>
+          <a:effectLst/>
+        </p:spPr>
+      </p:pic>
+    </p:spTree>
+  </p:cSld>
+  <p:clrMapOvr>
+    <a:masterClrMapping/>
+  </p:clrMapOvr>
+</p:sld>
+</file>
+
+<file path=ppt/slides/slide11.xml><?xml version="1.0" encoding="utf-8"?>
+<p:sld xmlns:a="http://schemas.openxmlformats.org/drawingml/2006/main" xmlns:r="http://schemas.openxmlformats.org/officeDocument/2006/relationships" xmlns:p="http://schemas.openxmlformats.org/presentationml/2006/main">
+  <p:cSld>
+    <p:spTree>
+      <p:nvGrpSpPr>
+        <p:cNvPr id="1" name=""/>
+        <p:cNvGrpSpPr/>
+        <p:nvPr/>
+      </p:nvGrpSpPr>
+      <p:grpSpPr>
+        <a:xfrm>
+          <a:off x="0" y="0"/>
+          <a:ext cx="0" cy="0"/>
+          <a:chOff x="0" y="0"/>
+          <a:chExt cx="0" cy="0"/>
+        </a:xfrm>
+      </p:grpSpPr>
+      <p:pic>
+        <p:nvPicPr>
+          <p:cNvPr id="2052" name="Picture 4"/>
+          <p:cNvPicPr>
+            <a:picLocks noChangeAspect="1" noChangeArrowheads="1"/>
+          </p:cNvPicPr>
+          <p:nvPr/>
+        </p:nvPicPr>
+        <p:blipFill>
+          <a:blip r:embed="rId2"/>
+          <a:srcRect/>
+          <a:stretch>
+            <a:fillRect/>
+          </a:stretch>
+        </p:blipFill>
+        <p:spPr bwMode="auto">
+          <a:xfrm>
+            <a:off x="1000100" y="5286388"/>
+            <a:ext cx="7638763" cy="1500198"/>
+          </a:xfrm>
+          <a:prstGeom prst="rect">
+            <a:avLst/>
+          </a:prstGeom>
+          <a:noFill/>
+          <a:ln w="9525">
+            <a:noFill/>
+            <a:miter lim="800000"/>
+            <a:headEnd/>
+            <a:tailEnd/>
+          </a:ln>
+          <a:effectLst/>
+        </p:spPr>
+      </p:pic>
+      <p:sp>
+        <p:nvSpPr>
+          <p:cNvPr id="4" name="Title 3"/>
+          <p:cNvSpPr>
+            <a:spLocks noGrp="1"/>
+          </p:cNvSpPr>
+          <p:nvPr>
+            <p:ph type="title"/>
+          </p:nvPr>
+        </p:nvSpPr>
+        <p:spPr/>
+        <p:txBody>
+          <a:bodyPr>
+            <a:noAutofit/>
+          </a:bodyPr>
+          <a:lstStyle/>
+          <a:p>
+            <a:r>
+              <a:rPr lang="en-US" altLang="ko-KR" sz="2800" b="1" dirty="0" smtClean="0"/>
+              <a:t>Raspberry Pi</a:t>
+            </a:r>
+            <a:r>
+              <a:rPr lang="ko-KR" altLang="en-US" sz="2800" b="1" dirty="0" smtClean="0"/>
+              <a:t> </a:t>
+            </a:r>
+            <a:r>
+              <a:rPr lang="en-US" altLang="ko-KR" sz="2800" b="1" dirty="0" smtClean="0"/>
+              <a:t>+ NCS Setup</a:t>
+            </a:r>
+            <a:endParaRPr lang="ko-KR" altLang="en-US" sz="2800" b="1" dirty="0"/>
+          </a:p>
+        </p:txBody>
+      </p:sp>
+      <p:sp>
+        <p:nvSpPr>
+          <p:cNvPr id="5" name="Content Placeholder 4"/>
+          <p:cNvSpPr>
+            <a:spLocks noGrp="1"/>
+          </p:cNvSpPr>
+          <p:nvPr>
+            <p:ph idx="1"/>
+          </p:nvPr>
+        </p:nvSpPr>
+        <p:spPr>
+          <a:xfrm>
+            <a:off x="457200" y="1142984"/>
+            <a:ext cx="8401080" cy="5214974"/>
+          </a:xfrm>
+        </p:spPr>
+        <p:txBody>
+          <a:bodyPr>
+            <a:noAutofit/>
+          </a:bodyPr>
+          <a:lstStyle/>
+          <a:p>
+            <a:pPr marL="450850" indent="-450850">
+              <a:lnSpc>
+                <a:spcPct val="150000"/>
+              </a:lnSpc>
+              <a:spcBef>
+                <a:spcPts val="100"/>
+              </a:spcBef>
+              <a:buNone/>
+            </a:pPr>
+            <a:r>
+              <a:rPr lang="en-US" altLang="ko-KR" sz="2400" b="1" dirty="0" smtClean="0"/>
+              <a:t>[</a:t>
+            </a:r>
+            <a:r>
+              <a:rPr lang="ko-KR" altLang="en-US" sz="2400" b="1" dirty="0" smtClean="0"/>
+              <a:t>방안 </a:t>
+            </a:r>
+            <a:r>
+              <a:rPr lang="en-US" altLang="ko-KR" sz="2400" b="1" dirty="0" smtClean="0"/>
+              <a:t>1 : </a:t>
+            </a:r>
+            <a:r>
+              <a:rPr lang="en-US" altLang="ko-KR" sz="2400" b="1" dirty="0" err="1" smtClean="0"/>
+              <a:t>Raspbian</a:t>
+            </a:r>
+            <a:r>
+              <a:rPr lang="en-US" altLang="ko-KR" sz="2400" b="1" dirty="0" smtClean="0"/>
+              <a:t> OS 10 (Buster) + OpenVINO </a:t>
+            </a:r>
+            <a:r>
+              <a:rPr lang="en-US" altLang="ko-KR" sz="2400" b="1" dirty="0" smtClean="0"/>
+              <a:t>2021.4.2]</a:t>
+            </a:r>
+            <a:endParaRPr lang="en-US" altLang="ko-KR" sz="2400" dirty="0" smtClean="0"/>
+          </a:p>
+          <a:p>
+            <a:pPr marL="457200" indent="-457200">
+              <a:lnSpc>
+                <a:spcPct val="150000"/>
+              </a:lnSpc>
+              <a:spcBef>
+                <a:spcPts val="100"/>
+              </a:spcBef>
+              <a:buFont typeface="+mj-lt"/>
+              <a:buAutoNum type="arabicParenR" startAt="2"/>
+            </a:pPr>
+            <a:r>
+              <a:rPr lang="en-US" altLang="ko-KR" sz="2400" dirty="0" smtClean="0"/>
+              <a:t>OpenVINO 2021.4 Runtime </a:t>
+            </a:r>
+            <a:r>
+              <a:rPr lang="ko-KR" altLang="en-US" sz="2400" dirty="0" smtClean="0"/>
+              <a:t>설치</a:t>
+            </a:r>
+            <a:endParaRPr lang="en-US" altLang="ko-KR" sz="2400" dirty="0" smtClean="0"/>
+          </a:p>
+        </p:txBody>
+      </p:sp>
+      <p:sp>
+        <p:nvSpPr>
+          <p:cNvPr id="7" name="TextBox 6"/>
+          <p:cNvSpPr txBox="1"/>
+          <p:nvPr/>
+        </p:nvSpPr>
+        <p:spPr>
+          <a:xfrm>
+            <a:off x="7215206" y="785794"/>
+            <a:ext cx="1632178" cy="276999"/>
+          </a:xfrm>
+          <a:prstGeom prst="rect">
+            <a:avLst/>
+          </a:prstGeom>
+          <a:noFill/>
+        </p:spPr>
+        <p:txBody>
+          <a:bodyPr wrap="none" rtlCol="0">
+            <a:spAutoFit/>
+          </a:bodyPr>
+          <a:lstStyle/>
+          <a:p>
+            <a:r>
+              <a:rPr lang="en-US" altLang="ko-KR" sz="1200" b="1" dirty="0" smtClean="0">
+                <a:solidFill>
+                  <a:srgbClr val="00B050"/>
+                </a:solidFill>
+                <a:latin typeface="맑은 고딕"/>
+                <a:ea typeface="맑은 고딕"/>
+              </a:rPr>
+              <a:t>※ </a:t>
+            </a:r>
+            <a:r>
+              <a:rPr lang="en-US" altLang="ko-KR" sz="1200" b="1" dirty="0" smtClean="0">
+                <a:solidFill>
+                  <a:srgbClr val="00B050"/>
+                </a:solidFill>
+              </a:rPr>
+              <a:t>2022. 12. 27 </a:t>
+            </a:r>
+            <a:r>
+              <a:rPr lang="ko-KR" altLang="en-US" sz="1200" b="1" dirty="0" smtClean="0">
+                <a:solidFill>
+                  <a:srgbClr val="00B050"/>
+                </a:solidFill>
+              </a:rPr>
+              <a:t>기준</a:t>
+            </a:r>
+            <a:endParaRPr lang="ko-KR" altLang="en-US" sz="1200" b="1" dirty="0">
+              <a:solidFill>
+                <a:srgbClr val="00B050"/>
+              </a:solidFill>
+            </a:endParaRPr>
+          </a:p>
+        </p:txBody>
+      </p:sp>
+      <p:sp>
+        <p:nvSpPr>
+          <p:cNvPr id="12" name="TextBox 11"/>
+          <p:cNvSpPr txBox="1"/>
+          <p:nvPr/>
+        </p:nvSpPr>
+        <p:spPr>
+          <a:xfrm>
+            <a:off x="1000100" y="2500306"/>
+            <a:ext cx="7643866" cy="2800767"/>
+          </a:xfrm>
+          <a:prstGeom prst="rect">
+            <a:avLst/>
+          </a:prstGeom>
+          <a:noFill/>
+        </p:spPr>
+        <p:txBody>
+          <a:bodyPr wrap="square" rtlCol="0">
+            <a:spAutoFit/>
+          </a:bodyPr>
+          <a:lstStyle/>
+          <a:p>
+            <a:pPr marL="450850" indent="-450850">
+              <a:buFont typeface="Wingdings" pitchFamily="2" charset="2"/>
+              <a:buAutoNum type="arabicParenBoth" startAt="18"/>
+            </a:pPr>
+            <a:r>
+              <a:rPr lang="en-US" altLang="ko-KR" sz="1600" b="1" dirty="0" smtClean="0"/>
+              <a:t>cd </a:t>
+            </a:r>
+            <a:r>
+              <a:rPr lang="en-US" altLang="ko-KR" sz="1600" b="1" dirty="0" smtClean="0"/>
+              <a:t>/home/&lt;USER&gt;/</a:t>
+            </a:r>
+            <a:r>
+              <a:rPr lang="en-US" altLang="ko-KR" sz="1600" b="1" dirty="0" err="1" smtClean="0"/>
+              <a:t>intel</a:t>
+            </a:r>
+            <a:r>
+              <a:rPr lang="en-US" altLang="ko-KR" sz="1600" b="1" dirty="0" smtClean="0"/>
+              <a:t>/openvino_2021.4.2</a:t>
+            </a:r>
+            <a:r>
+              <a:rPr lang="en-US" altLang="ko-KR" sz="1600" dirty="0" smtClean="0"/>
+              <a:t> : </a:t>
+            </a:r>
+            <a:r>
+              <a:rPr lang="en-US" altLang="ko-KR" sz="1600" dirty="0" err="1" smtClean="0"/>
+              <a:t>openvino</a:t>
+            </a:r>
+            <a:r>
+              <a:rPr lang="en-US" altLang="ko-KR" sz="1600" dirty="0" smtClean="0"/>
+              <a:t> </a:t>
+            </a:r>
+            <a:r>
+              <a:rPr lang="ko-KR" altLang="en-US" sz="1600" dirty="0" smtClean="0"/>
+              <a:t>디렉토리로 </a:t>
+            </a:r>
+            <a:r>
+              <a:rPr lang="ko-KR" altLang="en-US" sz="1600" dirty="0" smtClean="0"/>
+              <a:t>이동</a:t>
+            </a:r>
+            <a:endParaRPr lang="en-US" altLang="ko-KR" sz="1600" dirty="0" smtClean="0"/>
+          </a:p>
+          <a:p>
+            <a:pPr marL="450850" indent="-450850"/>
+            <a:r>
+              <a:rPr lang="en-US" altLang="ko-KR" sz="1600" dirty="0" smtClean="0"/>
+              <a:t> </a:t>
+            </a:r>
+          </a:p>
+          <a:p>
+            <a:pPr marL="450850" indent="-450850">
+              <a:buFont typeface="Wingdings" pitchFamily="2" charset="2"/>
+              <a:buAutoNum type="arabicParenBoth" startAt="19"/>
+            </a:pPr>
+            <a:r>
+              <a:rPr lang="en-US" altLang="ko-KR" sz="1600" b="1" dirty="0" smtClean="0"/>
+              <a:t>cd inference engine</a:t>
+            </a:r>
+            <a:r>
+              <a:rPr lang="en-US" altLang="ko-KR" sz="1600" dirty="0" smtClean="0"/>
+              <a:t> : inference engine </a:t>
+            </a:r>
+            <a:r>
+              <a:rPr lang="ko-KR" altLang="en-US" sz="1600" dirty="0" smtClean="0"/>
+              <a:t>디렉토리로 이동</a:t>
+            </a:r>
+            <a:endParaRPr lang="en-US" altLang="ko-KR" sz="1600" dirty="0" smtClean="0"/>
+          </a:p>
+          <a:p>
+            <a:pPr marL="450850" indent="-450850">
+              <a:buAutoNum type="arabicParenBoth" startAt="19"/>
+            </a:pPr>
+            <a:endParaRPr lang="en-US" altLang="ko-KR" sz="1600" dirty="0" smtClean="0"/>
+          </a:p>
+          <a:p>
+            <a:pPr marL="450850" indent="-450850">
+              <a:buAutoNum type="arabicParenBoth" startAt="19"/>
+            </a:pPr>
+            <a:r>
+              <a:rPr lang="en-US" altLang="ko-KR" sz="1600" b="1" dirty="0" smtClean="0"/>
+              <a:t>cd ./samples/python/</a:t>
+            </a:r>
+            <a:r>
+              <a:rPr lang="en-US" altLang="ko-KR" sz="1600" b="1" dirty="0" err="1" smtClean="0"/>
+              <a:t>hello_query_device</a:t>
+            </a:r>
+            <a:endParaRPr lang="en-US" altLang="ko-KR" sz="1600" b="1" dirty="0" smtClean="0"/>
+          </a:p>
+          <a:p>
+            <a:pPr marL="450850" indent="-450850"/>
+            <a:r>
+              <a:rPr lang="en-US" altLang="ko-KR" sz="1600" dirty="0" smtClean="0"/>
+              <a:t>       : Python </a:t>
+            </a:r>
+            <a:r>
+              <a:rPr lang="ko-KR" altLang="en-US" sz="1600" dirty="0" smtClean="0"/>
+              <a:t>예제 중 디바이스 조회 예제로 이동</a:t>
+            </a:r>
+            <a:endParaRPr lang="en-US" altLang="ko-KR" sz="1600" dirty="0" smtClean="0"/>
+          </a:p>
+          <a:p>
+            <a:pPr marL="450850" indent="-450850"/>
+            <a:endParaRPr lang="en-US" altLang="ko-KR" sz="1600" dirty="0" smtClean="0"/>
+          </a:p>
+          <a:p>
+            <a:pPr marL="450850" indent="-450850">
+              <a:buFont typeface="Wingdings" pitchFamily="2" charset="2"/>
+              <a:buAutoNum type="arabicParenBoth" startAt="21"/>
+            </a:pPr>
+            <a:r>
+              <a:rPr lang="en-US" altLang="ko-KR" sz="1600" b="1" dirty="0" smtClean="0"/>
+              <a:t>python3 </a:t>
+            </a:r>
+            <a:r>
+              <a:rPr lang="en-US" altLang="ko-KR" sz="1600" b="1" dirty="0" smtClean="0"/>
+              <a:t>hello_query_device.py </a:t>
+            </a:r>
+            <a:r>
+              <a:rPr lang="ko-KR" altLang="en-US" sz="1600" b="1" dirty="0" smtClean="0"/>
+              <a:t>실행</a:t>
+            </a:r>
+            <a:endParaRPr lang="en-US" altLang="ko-KR" sz="1600" b="1" dirty="0" smtClean="0"/>
+          </a:p>
+          <a:p>
+            <a:pPr marL="450850" indent="-450850">
+              <a:buAutoNum type="arabicParenBoth" startAt="21"/>
+            </a:pPr>
+            <a:endParaRPr lang="en-US" altLang="ko-KR" sz="1600" dirty="0" smtClean="0"/>
+          </a:p>
+          <a:p>
+            <a:pPr marL="450850" indent="-450850">
+              <a:buAutoNum type="arabicParenBoth" startAt="21"/>
+            </a:pPr>
+            <a:r>
+              <a:rPr lang="en-US" altLang="ko-KR" sz="1600" b="1" dirty="0" smtClean="0"/>
+              <a:t>MYRIAD </a:t>
+            </a:r>
+            <a:r>
+              <a:rPr lang="ko-KR" altLang="en-US" sz="1600" b="1" dirty="0" smtClean="0"/>
+              <a:t>디바이스 조회 확인</a:t>
+            </a:r>
+            <a:r>
+              <a:rPr lang="en-US" altLang="ko-KR" sz="1600" b="1" dirty="0" smtClean="0"/>
+              <a:t> </a:t>
+            </a:r>
+            <a:endParaRPr lang="en-US" altLang="ko-KR" sz="1600" b="1" dirty="0" smtClean="0"/>
+          </a:p>
+          <a:p>
+            <a:pPr marL="450850" indent="-450850"/>
+            <a:r>
+              <a:rPr lang="en-US" altLang="ko-KR" sz="1600" b="1" dirty="0" smtClean="0"/>
+              <a:t> </a:t>
+            </a:r>
+            <a:r>
+              <a:rPr lang="en-US" altLang="ko-KR" sz="1600" b="1" dirty="0" smtClean="0"/>
+              <a:t>      </a:t>
+            </a:r>
+            <a:r>
+              <a:rPr lang="en-US" altLang="ko-KR" sz="1600" dirty="0" smtClean="0"/>
+              <a:t>: OpenVINO </a:t>
+            </a:r>
+            <a:r>
+              <a:rPr lang="ko-KR" altLang="en-US" sz="1600" dirty="0" smtClean="0"/>
+              <a:t>라이브러리를 이용하여 </a:t>
+            </a:r>
+            <a:r>
+              <a:rPr lang="en-US" altLang="ko-KR" sz="1600" dirty="0" smtClean="0"/>
+              <a:t>NCS 2</a:t>
+            </a:r>
+            <a:r>
+              <a:rPr lang="ko-KR" altLang="en-US" sz="1600" dirty="0" smtClean="0"/>
+              <a:t>가 제대로 </a:t>
+            </a:r>
+            <a:r>
+              <a:rPr lang="ko-KR" altLang="en-US" sz="1600" dirty="0" smtClean="0"/>
+              <a:t>인식</a:t>
+            </a:r>
+            <a:r>
+              <a:rPr lang="ko-KR" altLang="en-US" sz="1600" dirty="0" smtClean="0"/>
+              <a:t>됨</a:t>
+            </a:r>
+            <a:endParaRPr lang="ko-KR" altLang="en-US" sz="1600" dirty="0"/>
+          </a:p>
+        </p:txBody>
+      </p:sp>
+      <p:pic>
+        <p:nvPicPr>
+          <p:cNvPr id="2051" name="Picture 3"/>
+          <p:cNvPicPr>
+            <a:picLocks noChangeAspect="1" noChangeArrowheads="1"/>
+          </p:cNvPicPr>
+          <p:nvPr/>
+        </p:nvPicPr>
+        <p:blipFill>
+          <a:blip r:embed="rId3"/>
+          <a:srcRect/>
+          <a:stretch>
+            <a:fillRect/>
+          </a:stretch>
+        </p:blipFill>
+        <p:spPr bwMode="auto">
+          <a:xfrm>
+            <a:off x="5000628" y="5786454"/>
+            <a:ext cx="3571900" cy="590592"/>
+          </a:xfrm>
+          <a:prstGeom prst="rect">
+            <a:avLst/>
+          </a:prstGeom>
+          <a:noFill/>
+          <a:ln w="9525">
+            <a:noFill/>
+            <a:miter lim="800000"/>
+            <a:headEnd/>
+            <a:tailEnd/>
+          </a:ln>
+          <a:effectLst/>
+        </p:spPr>
+      </p:pic>
+    </p:spTree>
+  </p:cSld>
+  <p:clrMapOvr>
+    <a:masterClrMapping/>
+  </p:clrMapOvr>
+</p:sld>
+</file>
+
+<file path=ppt/slides/slide12.xml><?xml version="1.0" encoding="utf-8"?>
+<p:sld xmlns:a="http://schemas.openxmlformats.org/drawingml/2006/main" xmlns:r="http://schemas.openxmlformats.org/officeDocument/2006/relationships" xmlns:p="http://schemas.openxmlformats.org/presentationml/2006/main">
+  <p:cSld>
+    <p:spTree>
+      <p:nvGrpSpPr>
+        <p:cNvPr id="1" name=""/>
+        <p:cNvGrpSpPr/>
+        <p:nvPr/>
+      </p:nvGrpSpPr>
+      <p:grpSpPr>
+        <a:xfrm>
+          <a:off x="0" y="0"/>
+          <a:ext cx="0" cy="0"/>
+          <a:chOff x="0" y="0"/>
+          <a:chExt cx="0" cy="0"/>
+        </a:xfrm>
+      </p:grpSpPr>
+      <p:sp>
+        <p:nvSpPr>
+          <p:cNvPr id="4" name="Title 3"/>
+          <p:cNvSpPr>
+            <a:spLocks noGrp="1"/>
+          </p:cNvSpPr>
+          <p:nvPr>
+            <p:ph type="title"/>
+          </p:nvPr>
+        </p:nvSpPr>
+        <p:spPr/>
+        <p:txBody>
+          <a:bodyPr>
+            <a:noAutofit/>
+          </a:bodyPr>
+          <a:lstStyle/>
+          <a:p>
+            <a:r>
+              <a:rPr lang="en-US" altLang="ko-KR" sz="2800" b="1" dirty="0" smtClean="0"/>
+              <a:t>Raspberry Pi</a:t>
+            </a:r>
+            <a:r>
+              <a:rPr lang="ko-KR" altLang="en-US" sz="2800" b="1" dirty="0" smtClean="0"/>
+              <a:t> </a:t>
+            </a:r>
+            <a:r>
+              <a:rPr lang="en-US" altLang="ko-KR" sz="2800" b="1" dirty="0" smtClean="0"/>
+              <a:t>4 + NCS 2 Setup</a:t>
+            </a:r>
+            <a:endParaRPr lang="ko-KR" altLang="en-US" sz="2800" b="1" dirty="0"/>
+          </a:p>
+        </p:txBody>
+      </p:sp>
+      <p:sp>
+        <p:nvSpPr>
+          <p:cNvPr id="5" name="Content Placeholder 4"/>
+          <p:cNvSpPr>
+            <a:spLocks noGrp="1"/>
+          </p:cNvSpPr>
+          <p:nvPr>
+            <p:ph idx="1"/>
+          </p:nvPr>
+        </p:nvSpPr>
+        <p:spPr>
+          <a:xfrm>
+            <a:off x="457200" y="1428736"/>
+            <a:ext cx="8229600" cy="5214974"/>
+          </a:xfrm>
+        </p:spPr>
+        <p:txBody>
+          <a:bodyPr>
+            <a:noAutofit/>
+          </a:bodyPr>
+          <a:lstStyle/>
+          <a:p>
+            <a:pPr marL="450850" indent="-450850">
+              <a:lnSpc>
+                <a:spcPct val="150000"/>
+              </a:lnSpc>
+              <a:spcBef>
+                <a:spcPts val="100"/>
+              </a:spcBef>
+              <a:buNone/>
+            </a:pPr>
+            <a:r>
+              <a:rPr lang="ko-KR" altLang="en-US" sz="2400" b="1" dirty="0" smtClean="0"/>
+              <a:t>방안 </a:t>
+            </a:r>
+            <a:r>
+              <a:rPr lang="en-US" altLang="ko-KR" sz="2400" b="1" dirty="0" smtClean="0"/>
+              <a:t>2 : </a:t>
+            </a:r>
+            <a:r>
+              <a:rPr lang="en-US" altLang="ko-KR" sz="2400" b="1" dirty="0" err="1" smtClean="0"/>
+              <a:t>Ubuntu</a:t>
+            </a:r>
+            <a:r>
+              <a:rPr lang="en-US" altLang="ko-KR" sz="2400" b="1" dirty="0" smtClean="0"/>
+              <a:t> 20.04 + OpenVINO 2022.</a:t>
+            </a:r>
+          </a:p>
+          <a:p>
+            <a:pPr marL="628650" indent="-266700">
+              <a:lnSpc>
+                <a:spcPct val="150000"/>
+              </a:lnSpc>
+              <a:spcBef>
+                <a:spcPts val="100"/>
+              </a:spcBef>
+              <a:buFont typeface="Wingdings" pitchFamily="2" charset="2"/>
+              <a:buChar char="§"/>
+              <a:tabLst>
+                <a:tab pos="628650" algn="l"/>
+              </a:tabLst>
+            </a:pPr>
+            <a:r>
+              <a:rPr lang="en-US" altLang="ko-KR" sz="1800" dirty="0" smtClean="0"/>
+              <a:t>R</a:t>
+            </a:r>
+          </a:p>
+          <a:p>
+            <a:pPr marL="450850" indent="-450850">
+              <a:lnSpc>
+                <a:spcPct val="150000"/>
+              </a:lnSpc>
+              <a:spcBef>
+                <a:spcPts val="100"/>
+              </a:spcBef>
+              <a:buNone/>
+            </a:pPr>
             <a:endParaRPr lang="en-US" altLang="ko-KR" sz="2400" b="1" dirty="0" smtClean="0"/>
           </a:p>
         </p:txBody>
@@ -3610,11 +4783,7 @@
           <a:p>
             <a:r>
               <a:rPr lang="en-US" altLang="ko-KR" sz="2800" b="1" dirty="0" smtClean="0"/>
-              <a:t>Raspberry </a:t>
-            </a:r>
-            <a:r>
-              <a:rPr lang="en-US" altLang="ko-KR" sz="2800" b="1" dirty="0" smtClean="0"/>
-              <a:t>Pi</a:t>
+              <a:t>Raspberry Pi</a:t>
             </a:r>
             <a:r>
               <a:rPr lang="ko-KR" altLang="en-US" sz="2800" b="1" dirty="0" smtClean="0"/>
@@ -3622,11 +4791,7 @@
             </a:r>
             <a:r>
               <a:rPr lang="en-US" altLang="ko-KR" sz="2800" b="1" dirty="0" smtClean="0"/>
-              <a:t>4 + </a:t>
-            </a:r>
-            <a:r>
-              <a:rPr lang="en-US" altLang="ko-KR" sz="2800" b="1" dirty="0" smtClean="0"/>
-              <a:t>NCS 2 Setup</a:t>
+              <a:t>4 + NCS 2 Setup</a:t>
             </a:r>
             <a:endParaRPr lang="ko-KR" altLang="en-US" sz="2800" b="1" dirty="0"/>
           </a:p>
@@ -3645,7 +4810,7 @@
         <p:spPr>
           <a:xfrm>
             <a:off x="457200" y="1428736"/>
-            <a:ext cx="8229600" cy="5214974"/>
+            <a:ext cx="8258204" cy="5214974"/>
           </a:xfrm>
         </p:spPr>
         <p:txBody>
@@ -3677,16 +4842,13 @@
             </a:r>
             <a:r>
               <a:rPr lang="en-US" altLang="ko-KR" sz="2400" b="1" dirty="0" smtClean="0"/>
-              <a:t> OS 10 (Buster) + </a:t>
-            </a:r>
-            <a:r>
-              <a:rPr lang="en-US" altLang="ko-KR" sz="2400" b="1" dirty="0" err="1" smtClean="0"/>
-              <a:t>OpenVINO</a:t>
+              <a:t> OS 10 (Buster) + OpenVINO </a:t>
             </a:r>
             <a:r>
               <a:rPr lang="en-US" altLang="ko-KR" sz="2400" b="1" dirty="0" smtClean="0"/>
-              <a:t> 2021.4</a:t>
-            </a:r>
+              <a:t>2021.4.2</a:t>
+            </a:r>
+            <a:endParaRPr lang="en-US" altLang="ko-KR" sz="2400" b="1" dirty="0" smtClean="0"/>
           </a:p>
           <a:p>
             <a:pPr marL="628650" indent="-266700">
@@ -3739,15 +4901,7 @@
             </a:r>
             <a:r>
               <a:rPr lang="en-US" altLang="ko-KR" sz="1400" b="1" dirty="0" smtClean="0"/>
-              <a:t>] </a:t>
-            </a:r>
-            <a:r>
-              <a:rPr lang="en-US" altLang="ko-KR" sz="1400" b="1" dirty="0" err="1" smtClean="0"/>
-              <a:t>OpenVINO</a:t>
-            </a:r>
-            <a:r>
-              <a:rPr lang="en-US" altLang="ko-KR" sz="1400" b="1" dirty="0" smtClean="0"/>
-              <a:t> </a:t>
+              <a:t>] OpenVINO </a:t>
             </a:r>
             <a:r>
               <a:rPr lang="ko-KR" altLang="en-US" sz="1400" b="1" dirty="0" smtClean="0"/>
@@ -3761,13 +4915,7 @@
               <a:rPr lang="en-US" altLang="ko-KR" sz="1400" b="1" dirty="0" smtClean="0">
                 <a:hlinkClick r:id="rId2"/>
               </a:rPr>
-              <a:t>https://</a:t>
-            </a:r>
-            <a:r>
-              <a:rPr lang="en-US" altLang="ko-KR" sz="1400" b="1" dirty="0" smtClean="0">
-                <a:hlinkClick r:id="rId2"/>
-              </a:rPr>
-              <a:t>hbesthee.tistory.com/2039</a:t>
+              <a:t>https://hbesthee.tistory.com/2039</a:t>
             </a:r>
             <a:endParaRPr lang="en-US" altLang="ko-KR" sz="1400" b="1" dirty="0" smtClean="0"/>
           </a:p>
@@ -3786,12 +4934,8 @@
               </a:tabLst>
             </a:pPr>
             <a:r>
-              <a:rPr lang="en-US" altLang="ko-KR" sz="1400" b="1" dirty="0" err="1" smtClean="0"/>
-              <a:t>OpenVINO</a:t>
-            </a:r>
-            <a:r>
               <a:rPr lang="en-US" altLang="ko-KR" sz="1400" b="1" dirty="0" smtClean="0"/>
-              <a:t> 2021.4 </a:t>
+              <a:t>OpenVINO 2021.4 </a:t>
             </a:r>
             <a:r>
               <a:rPr lang="en-US" altLang="ko-KR" sz="1400" b="1" dirty="0" err="1" smtClean="0"/>
@@ -3813,13 +4957,7 @@
               <a:rPr lang="en-US" altLang="ko-KR" sz="1400" b="1" dirty="0" smtClean="0">
                 <a:hlinkClick r:id="rId3"/>
               </a:rPr>
-              <a:t>https://</a:t>
-            </a:r>
-            <a:r>
-              <a:rPr lang="en-US" altLang="ko-KR" sz="1400" b="1" dirty="0" smtClean="0">
-                <a:hlinkClick r:id="rId3"/>
-              </a:rPr>
-              <a:t>docs.openvino.ai/2021.4/openvino_docs_install_guides_installing_openvino_raspbian.html</a:t>
+              <a:t>https://docs.openvino.ai/2021.4/openvino_docs_install_guides_installing_openvino_raspbian.html</a:t>
             </a:r>
             <a:endParaRPr lang="en-US" altLang="ko-KR" sz="1400" b="1" dirty="0" smtClean="0"/>
           </a:p>
@@ -3838,12 +4976,8 @@
               </a:tabLst>
             </a:pPr>
             <a:r>
-              <a:rPr lang="en-US" altLang="ko-KR" sz="1400" b="1" dirty="0" err="1" smtClean="0"/>
-              <a:t>OpenVINO</a:t>
-            </a:r>
-            <a:r>
               <a:rPr lang="en-US" altLang="ko-KR" sz="1400" b="1" dirty="0" smtClean="0"/>
-              <a:t> 2021.4 </a:t>
+              <a:t>OpenVINO 2021.4 </a:t>
             </a:r>
             <a:r>
               <a:rPr lang="ko-KR" altLang="en-US" sz="1400" b="1" dirty="0" smtClean="0"/>
@@ -3857,13 +4991,7 @@
               <a:rPr lang="en-US" altLang="ko-KR" sz="1400" b="1" dirty="0" smtClean="0">
                 <a:hlinkClick r:id="rId4"/>
               </a:rPr>
-              <a:t>https://</a:t>
-            </a:r>
-            <a:r>
-              <a:rPr lang="en-US" altLang="ko-KR" sz="1400" b="1" dirty="0" smtClean="0">
-                <a:hlinkClick r:id="rId4"/>
-              </a:rPr>
-              <a:t>storage.openvinotoolkit.org/repositories/openvino/packages/2021.4.2/</a:t>
+              <a:t>https://storage.openvinotoolkit.org/repositories/openvino/packages/2021.4.2/</a:t>
             </a:r>
             <a:endParaRPr lang="en-US" altLang="ko-KR" sz="1400" b="1" dirty="0" smtClean="0"/>
           </a:p>
@@ -3882,28 +5010,14 @@
               </a:tabLst>
             </a:pPr>
             <a:r>
-              <a:rPr lang="en-US" altLang="ko-KR" sz="1400" b="1" dirty="0" err="1" smtClean="0"/>
-              <a:t>OpenVINO</a:t>
-            </a:r>
-            <a:r>
               <a:rPr lang="en-US" altLang="ko-KR" sz="1400" b="1" dirty="0" smtClean="0"/>
-              <a:t> 2021.4 Python </a:t>
-            </a:r>
-            <a:r>
-              <a:rPr lang="en-US" altLang="ko-KR" sz="1400" b="1" dirty="0" smtClean="0"/>
-              <a:t>API Documentation : </a:t>
+              <a:t>OpenVINO 2021.4 Python API Documentation : </a:t>
             </a:r>
             <a:r>
               <a:rPr lang="en-US" altLang="ko-KR" sz="1400" b="1" dirty="0" smtClean="0">
                 <a:hlinkClick r:id="rId5"/>
               </a:rPr>
-              <a:t>https://docs.openvino.ai/2021.4/api/ie_python_api/_</a:t>
-            </a:r>
-            <a:r>
-              <a:rPr lang="en-US" altLang="ko-KR" sz="1400" b="1" dirty="0" smtClean="0">
-                <a:hlinkClick r:id="rId5"/>
-              </a:rPr>
-              <a:t>autosummary/openvino.inference_engine.html#module-openvino.inference_engine</a:t>
+              <a:t>https://docs.openvino.ai/2021.4/api/ie_python_api/_autosummary/openvino.inference_engine.html#module-openvino.inference_engine</a:t>
             </a:r>
             <a:endParaRPr lang="en-US" altLang="ko-KR" sz="1400" b="1" dirty="0" smtClean="0"/>
           </a:p>
@@ -3922,12 +5036,8 @@
               </a:tabLst>
             </a:pPr>
             <a:r>
-              <a:rPr lang="en-US" altLang="ko-KR" sz="1400" b="1" dirty="0" err="1" smtClean="0"/>
-              <a:t>OpenVINO</a:t>
-            </a:r>
-            <a:r>
               <a:rPr lang="en-US" altLang="ko-KR" sz="1400" b="1" dirty="0" smtClean="0"/>
-              <a:t> </a:t>
+              <a:t>OpenVINO </a:t>
             </a:r>
             <a:r>
               <a:rPr lang="en-US" altLang="ko-KR" sz="1400" b="1" dirty="0" err="1" smtClean="0"/>
@@ -3935,15 +5045,7 @@
             </a:r>
             <a:r>
               <a:rPr lang="en-US" altLang="ko-KR" sz="1400" b="1" dirty="0" smtClean="0"/>
-              <a:t> – ONNX – </a:t>
-            </a:r>
-            <a:r>
-              <a:rPr lang="en-US" altLang="ko-KR" sz="1400" b="1" dirty="0" err="1" smtClean="0"/>
-              <a:t>OpenVINO</a:t>
-            </a:r>
-            <a:r>
-              <a:rPr lang="en-US" altLang="ko-KR" sz="1400" b="1" dirty="0" smtClean="0"/>
-              <a:t> IR </a:t>
+              <a:t> – ONNX – OpenVINO IR </a:t>
             </a:r>
             <a:r>
               <a:rPr lang="ko-KR" altLang="en-US" sz="1400" b="1" dirty="0" smtClean="0"/>
@@ -3957,19 +5059,12 @@
               <a:rPr lang="en-US" altLang="ko-KR" sz="1400" b="1" dirty="0" smtClean="0">
                 <a:hlinkClick r:id="rId6"/>
               </a:rPr>
-              <a:t>https://</a:t>
-            </a:r>
-            <a:r>
-              <a:rPr lang="en-US" altLang="ko-KR" sz="1400" b="1" dirty="0" smtClean="0">
-                <a:hlinkClick r:id="rId6"/>
-              </a:rPr>
-              <a:t>docs.openvino.ai/2021.4/notebooks/102-pytorch-onnx-to-openvino-with-output.html</a:t>
+              <a:t>https://docs.openvino.ai/2021.4/notebooks/102-pytorch-onnx-to-openvino-with-output.html</a:t>
             </a:r>
             <a:r>
               <a:rPr lang="en-US" altLang="ko-KR" sz="1400" b="1" dirty="0" smtClean="0"/>
               <a:t> </a:t>
             </a:r>
-            <a:endParaRPr lang="en-US" altLang="ko-KR" sz="1400" b="1" dirty="0" smtClean="0"/>
           </a:p>
         </p:txBody>
       </p:sp>
@@ -4073,11 +5168,7 @@
           <a:p>
             <a:r>
               <a:rPr lang="en-US" altLang="ko-KR" sz="2800" b="1" dirty="0" smtClean="0"/>
-              <a:t>Raspberry </a:t>
-            </a:r>
-            <a:r>
-              <a:rPr lang="en-US" altLang="ko-KR" sz="2800" b="1" dirty="0" smtClean="0"/>
-              <a:t>Pi</a:t>
+              <a:t>Raspberry Pi</a:t>
             </a:r>
             <a:r>
               <a:rPr lang="ko-KR" altLang="en-US" sz="2800" b="1" dirty="0" smtClean="0"/>
@@ -4085,11 +5176,7 @@
             </a:r>
             <a:r>
               <a:rPr lang="en-US" altLang="ko-KR" sz="2800" b="1" dirty="0" smtClean="0"/>
-              <a:t>+ </a:t>
-            </a:r>
-            <a:r>
-              <a:rPr lang="en-US" altLang="ko-KR" sz="2800" b="1" dirty="0" smtClean="0"/>
-              <a:t>NCS Setup</a:t>
+              <a:t>+ NCS Setup</a:t>
             </a:r>
             <a:endParaRPr lang="ko-KR" altLang="en-US" sz="2800" b="1" dirty="0"/>
           </a:p>
@@ -4108,7 +5195,7 @@
         <p:spPr>
           <a:xfrm>
             <a:off x="457200" y="1428736"/>
-            <a:ext cx="8229600" cy="5214974"/>
+            <a:ext cx="8401080" cy="5214974"/>
           </a:xfrm>
         </p:spPr>
         <p:txBody>
@@ -4141,20 +5228,13 @@
             </a:r>
             <a:r>
               <a:rPr lang="en-US" altLang="ko-KR" sz="2400" b="1" dirty="0" smtClean="0"/>
-              <a:t> OS 10 (Buster) + </a:t>
-            </a:r>
-            <a:r>
-              <a:rPr lang="en-US" altLang="ko-KR" sz="2400" b="1" dirty="0" err="1" smtClean="0"/>
-              <a:t>OpenVINO</a:t>
+              <a:t> OS 10 (Buster) + OpenVINO </a:t>
             </a:r>
             <a:r>
               <a:rPr lang="en-US" altLang="ko-KR" sz="2400" b="1" dirty="0" smtClean="0"/>
-              <a:t> 2021.4</a:t>
-            </a:r>
-            <a:r>
-              <a:rPr lang="en-US" altLang="ko-KR" sz="2400" b="1" dirty="0" smtClean="0"/>
-              <a:t>]</a:t>
-            </a:r>
+              <a:t>2021.4.2]</a:t>
+            </a:r>
+            <a:endParaRPr lang="en-US" altLang="ko-KR" sz="2400" b="1" dirty="0" smtClean="0"/>
           </a:p>
           <a:p>
             <a:pPr marL="450850" indent="-450850">
@@ -4179,15 +5259,7 @@
             </a:r>
             <a:r>
               <a:rPr lang="en-US" altLang="ko-KR" sz="2400" dirty="0" smtClean="0"/>
-              <a:t> OS 10 (</a:t>
-            </a:r>
-            <a:r>
-              <a:rPr lang="en-US" altLang="ko-KR" sz="2400" dirty="0" smtClean="0"/>
-              <a:t>Buster</a:t>
-            </a:r>
-            <a:r>
-              <a:rPr lang="en-US" altLang="ko-KR" sz="2400" dirty="0" smtClean="0"/>
-              <a:t>) </a:t>
+              <a:t> OS 10 (Buster) </a:t>
             </a:r>
             <a:r>
               <a:rPr lang="ko-KR" altLang="en-US" sz="2400" dirty="0" smtClean="0"/>
@@ -4214,12 +5286,8 @@
               <a:buAutoNum type="arabicParenR"/>
             </a:pPr>
             <a:r>
-              <a:rPr lang="en-US" altLang="ko-KR" sz="2400" dirty="0" err="1" smtClean="0"/>
-              <a:t>OpenVINO</a:t>
-            </a:r>
-            <a:r>
               <a:rPr lang="en-US" altLang="ko-KR" sz="2400" dirty="0" smtClean="0"/>
-              <a:t> 2021.4 Runtime </a:t>
+              <a:t>OpenVINO 2021.4 Runtime </a:t>
             </a:r>
             <a:r>
               <a:rPr lang="ko-KR" altLang="en-US" sz="2400" dirty="0" smtClean="0"/>
@@ -4329,11 +5397,7 @@
           <a:p>
             <a:r>
               <a:rPr lang="en-US" altLang="ko-KR" sz="2800" b="1" dirty="0" smtClean="0"/>
-              <a:t>Raspberry </a:t>
-            </a:r>
-            <a:r>
-              <a:rPr lang="en-US" altLang="ko-KR" sz="2800" b="1" dirty="0" smtClean="0"/>
-              <a:t>Pi</a:t>
+              <a:t>Raspberry Pi</a:t>
             </a:r>
             <a:r>
               <a:rPr lang="ko-KR" altLang="en-US" sz="2800" b="1" dirty="0" smtClean="0"/>
@@ -4341,11 +5405,7 @@
             </a:r>
             <a:r>
               <a:rPr lang="en-US" altLang="ko-KR" sz="2800" b="1" dirty="0" smtClean="0"/>
-              <a:t>+ </a:t>
-            </a:r>
-            <a:r>
-              <a:rPr lang="en-US" altLang="ko-KR" sz="2800" b="1" dirty="0" smtClean="0"/>
-              <a:t>NCS Setup</a:t>
+              <a:t>+ NCS Setup</a:t>
             </a:r>
             <a:endParaRPr lang="ko-KR" altLang="en-US" sz="2800" b="1" dirty="0"/>
           </a:p>
@@ -4363,8 +5423,8 @@
         </p:nvSpPr>
         <p:spPr>
           <a:xfrm>
-            <a:off x="457200" y="1428736"/>
-            <a:ext cx="8229600" cy="5214974"/>
+            <a:off x="457200" y="1142984"/>
+            <a:ext cx="8401080" cy="5214974"/>
           </a:xfrm>
         </p:spPr>
         <p:txBody>
@@ -4374,6 +5434,45 @@
           <a:lstStyle/>
           <a:p>
             <a:pPr marL="450850" indent="-450850">
+              <a:lnSpc>
+                <a:spcPct val="150000"/>
+              </a:lnSpc>
+              <a:spcBef>
+                <a:spcPts val="100"/>
+              </a:spcBef>
+              <a:buNone/>
+            </a:pPr>
+            <a:r>
+              <a:rPr lang="en-US" altLang="ko-KR" sz="2400" b="1" dirty="0" smtClean="0"/>
+              <a:t>[</a:t>
+            </a:r>
+            <a:r>
+              <a:rPr lang="ko-KR" altLang="en-US" sz="2400" b="1" dirty="0" smtClean="0"/>
+              <a:t>방안 </a:t>
+            </a:r>
+            <a:r>
+              <a:rPr lang="en-US" altLang="ko-KR" sz="2400" b="1" dirty="0" smtClean="0"/>
+              <a:t>1 : </a:t>
+            </a:r>
+            <a:r>
+              <a:rPr lang="en-US" altLang="ko-KR" sz="2400" b="1" dirty="0" err="1" smtClean="0"/>
+              <a:t>Raspbian</a:t>
+            </a:r>
+            <a:r>
+              <a:rPr lang="en-US" altLang="ko-KR" sz="2400" b="1" dirty="0" smtClean="0"/>
+              <a:t> OS 10 (Buster) + OpenVINO </a:t>
+            </a:r>
+            <a:r>
+              <a:rPr lang="en-US" altLang="ko-KR" sz="2400" b="1" dirty="0" smtClean="0"/>
+              <a:t>2021.4.2]</a:t>
+            </a:r>
+            <a:endParaRPr lang="en-US" altLang="ko-KR" sz="2400" dirty="0" smtClean="0"/>
+          </a:p>
+          <a:p>
+            <a:pPr marL="450850" indent="-450850">
+              <a:lnSpc>
+                <a:spcPct val="150000"/>
+              </a:lnSpc>
               <a:spcBef>
                 <a:spcPts val="100"/>
               </a:spcBef>
@@ -4386,7 +5485,11 @@
             </a:r>
             <a:r>
               <a:rPr lang="en-US" altLang="ko-KR" sz="2400" dirty="0" smtClean="0"/>
-              <a:t> OS 10 (Buster) </a:t>
+              <a:t> </a:t>
+            </a:r>
+            <a:r>
+              <a:rPr lang="en-US" altLang="ko-KR" sz="2400" dirty="0" smtClean="0"/>
+              <a:t>OS 10 (Buster) </a:t>
             </a:r>
             <a:r>
               <a:rPr lang="ko-KR" altLang="en-US" sz="2400" dirty="0" smtClean="0"/>
@@ -4477,7 +5580,7 @@
         </p:blipFill>
         <p:spPr bwMode="auto">
           <a:xfrm>
-            <a:off x="1546987" y="2071678"/>
+            <a:off x="1546987" y="2357430"/>
             <a:ext cx="2604835" cy="1785950"/>
           </a:xfrm>
           <a:prstGeom prst="rect">
@@ -4512,7 +5615,7 @@
         </p:blipFill>
         <p:spPr bwMode="auto">
           <a:xfrm>
-            <a:off x="5640282" y="2071678"/>
+            <a:off x="5640282" y="2357430"/>
             <a:ext cx="2603381" cy="1785950"/>
           </a:xfrm>
           <a:prstGeom prst="rect">
@@ -4547,7 +5650,7 @@
         </p:blipFill>
         <p:spPr bwMode="auto">
           <a:xfrm>
-            <a:off x="1552554" y="4429132"/>
+            <a:off x="1552554" y="4656146"/>
             <a:ext cx="2645707" cy="1785950"/>
           </a:xfrm>
           <a:prstGeom prst="rect">
@@ -4582,7 +5685,7 @@
         </p:blipFill>
         <p:spPr bwMode="auto">
           <a:xfrm>
-            <a:off x="5643570" y="4416432"/>
+            <a:off x="5643570" y="4643446"/>
             <a:ext cx="2643206" cy="1825071"/>
           </a:xfrm>
           <a:prstGeom prst="rect">
@@ -4608,7 +5711,7 @@
         </p:nvSpPr>
         <p:spPr>
           <a:xfrm>
-            <a:off x="722798" y="3929066"/>
+            <a:off x="722798" y="4214818"/>
             <a:ext cx="4349268" cy="338554"/>
           </a:xfrm>
           <a:prstGeom prst="rect">
@@ -4642,7 +5745,7 @@
         </p:nvSpPr>
         <p:spPr>
           <a:xfrm>
-            <a:off x="5457581" y="3929066"/>
+            <a:off x="5457581" y="4214818"/>
             <a:ext cx="3186385" cy="338554"/>
           </a:xfrm>
           <a:prstGeom prst="rect">
@@ -4680,7 +5783,7 @@
         </p:nvSpPr>
         <p:spPr>
           <a:xfrm>
-            <a:off x="1142976" y="6286520"/>
+            <a:off x="1142976" y="6513534"/>
             <a:ext cx="3329053" cy="338554"/>
           </a:xfrm>
           <a:prstGeom prst="rect">
@@ -4714,7 +5817,7 @@
         </p:nvSpPr>
         <p:spPr>
           <a:xfrm>
-            <a:off x="6286512" y="6286520"/>
+            <a:off x="6286512" y="6513534"/>
             <a:ext cx="1388522" cy="338554"/>
           </a:xfrm>
           <a:prstGeom prst="rect">
@@ -4748,7 +5851,7 @@
         </p:nvSpPr>
         <p:spPr>
           <a:xfrm>
-            <a:off x="1643042" y="3221036"/>
+            <a:off x="1643042" y="3506788"/>
             <a:ext cx="857256" cy="214314"/>
           </a:xfrm>
           <a:prstGeom prst="rect">
@@ -4793,7 +5896,7 @@
         </p:nvSpPr>
         <p:spPr>
           <a:xfrm>
-            <a:off x="5786446" y="3071810"/>
+            <a:off x="5786446" y="3357562"/>
             <a:ext cx="2286016" cy="285752"/>
           </a:xfrm>
           <a:prstGeom prst="rect">
@@ -4838,7 +5941,7 @@
         </p:nvSpPr>
         <p:spPr>
           <a:xfrm>
-            <a:off x="1714480" y="4929198"/>
+            <a:off x="1714480" y="5156212"/>
             <a:ext cx="2286016" cy="571504"/>
           </a:xfrm>
           <a:prstGeom prst="rect">
@@ -4883,7 +5986,7 @@
         </p:nvSpPr>
         <p:spPr>
           <a:xfrm>
-            <a:off x="7793060" y="5910280"/>
+            <a:off x="7793060" y="6137294"/>
             <a:ext cx="357190" cy="285752"/>
           </a:xfrm>
           <a:prstGeom prst="rect">
@@ -4964,11 +6067,7 @@
           <a:p>
             <a:r>
               <a:rPr lang="en-US" altLang="ko-KR" sz="2800" b="1" dirty="0" smtClean="0"/>
-              <a:t>Raspberry </a:t>
-            </a:r>
-            <a:r>
-              <a:rPr lang="en-US" altLang="ko-KR" sz="2800" b="1" dirty="0" smtClean="0"/>
-              <a:t>Pi</a:t>
+              <a:t>Raspberry Pi</a:t>
             </a:r>
             <a:r>
               <a:rPr lang="ko-KR" altLang="en-US" sz="2800" b="1" dirty="0" smtClean="0"/>
@@ -4976,11 +6075,7 @@
             </a:r>
             <a:r>
               <a:rPr lang="en-US" altLang="ko-KR" sz="2800" b="1" dirty="0" smtClean="0"/>
-              <a:t>+ </a:t>
-            </a:r>
-            <a:r>
-              <a:rPr lang="en-US" altLang="ko-KR" sz="2800" b="1" dirty="0" smtClean="0"/>
-              <a:t>NCS Setup</a:t>
+              <a:t>+ NCS Setup</a:t>
             </a:r>
             <a:endParaRPr lang="ko-KR" altLang="en-US" sz="2800" b="1" dirty="0"/>
           </a:p>
@@ -4998,8 +6093,8 @@
         </p:nvSpPr>
         <p:spPr>
           <a:xfrm>
-            <a:off x="457200" y="1428736"/>
-            <a:ext cx="8229600" cy="5214974"/>
+            <a:off x="457200" y="1142984"/>
+            <a:ext cx="8401080" cy="5214974"/>
           </a:xfrm>
         </p:spPr>
         <p:txBody>
@@ -5009,6 +6104,45 @@
           <a:lstStyle/>
           <a:p>
             <a:pPr marL="450850" indent="-450850">
+              <a:lnSpc>
+                <a:spcPct val="150000"/>
+              </a:lnSpc>
+              <a:spcBef>
+                <a:spcPts val="100"/>
+              </a:spcBef>
+              <a:buNone/>
+            </a:pPr>
+            <a:r>
+              <a:rPr lang="en-US" altLang="ko-KR" sz="2400" b="1" dirty="0" smtClean="0"/>
+              <a:t>[</a:t>
+            </a:r>
+            <a:r>
+              <a:rPr lang="ko-KR" altLang="en-US" sz="2400" b="1" dirty="0" smtClean="0"/>
+              <a:t>방안 </a:t>
+            </a:r>
+            <a:r>
+              <a:rPr lang="en-US" altLang="ko-KR" sz="2400" b="1" dirty="0" smtClean="0"/>
+              <a:t>1 : </a:t>
+            </a:r>
+            <a:r>
+              <a:rPr lang="en-US" altLang="ko-KR" sz="2400" b="1" dirty="0" err="1" smtClean="0"/>
+              <a:t>Raspbian</a:t>
+            </a:r>
+            <a:r>
+              <a:rPr lang="en-US" altLang="ko-KR" sz="2400" b="1" dirty="0" smtClean="0"/>
+              <a:t> OS 10 (Buster) + OpenVINO </a:t>
+            </a:r>
+            <a:r>
+              <a:rPr lang="en-US" altLang="ko-KR" sz="2400" b="1" dirty="0" smtClean="0"/>
+              <a:t>2021.4.2]</a:t>
+            </a:r>
+            <a:endParaRPr lang="en-US" altLang="ko-KR" sz="2400" dirty="0" smtClean="0"/>
+          </a:p>
+          <a:p>
+            <a:pPr marL="450850" indent="-450850">
+              <a:lnSpc>
+                <a:spcPct val="150000"/>
+              </a:lnSpc>
               <a:spcBef>
                 <a:spcPts val="100"/>
               </a:spcBef>
@@ -5021,7 +6155,11 @@
             </a:r>
             <a:r>
               <a:rPr lang="en-US" altLang="ko-KR" sz="2400" dirty="0" smtClean="0"/>
-              <a:t> OS 10 (Buster) </a:t>
+              <a:t> </a:t>
+            </a:r>
+            <a:r>
+              <a:rPr lang="en-US" altLang="ko-KR" sz="2400" dirty="0" smtClean="0"/>
+              <a:t>OS 10 (Buster) </a:t>
             </a:r>
             <a:r>
               <a:rPr lang="ko-KR" altLang="en-US" sz="2400" dirty="0" smtClean="0"/>
@@ -5112,7 +6250,7 @@
         </p:blipFill>
         <p:spPr bwMode="auto">
           <a:xfrm>
-            <a:off x="571472" y="2214554"/>
+            <a:off x="571472" y="2357430"/>
             <a:ext cx="3000396" cy="2043106"/>
           </a:xfrm>
           <a:prstGeom prst="rect">
@@ -5147,7 +6285,7 @@
         </p:blipFill>
         <p:spPr bwMode="auto">
           <a:xfrm>
-            <a:off x="571472" y="4429132"/>
+            <a:off x="571472" y="4572008"/>
             <a:ext cx="3000396" cy="2035824"/>
           </a:xfrm>
           <a:prstGeom prst="rect">
@@ -5173,7 +6311,7 @@
         </p:nvSpPr>
         <p:spPr>
           <a:xfrm>
-            <a:off x="1071538" y="2714620"/>
+            <a:off x="1071538" y="2857496"/>
             <a:ext cx="1928826" cy="1500198"/>
           </a:xfrm>
           <a:prstGeom prst="rect">
@@ -5218,7 +6356,7 @@
         </p:nvSpPr>
         <p:spPr>
           <a:xfrm>
-            <a:off x="3643306" y="3143248"/>
+            <a:off x="3643306" y="3286124"/>
             <a:ext cx="5298245" cy="338554"/>
           </a:xfrm>
           <a:prstGeom prst="rect">
@@ -5260,7 +6398,7 @@
         </p:nvSpPr>
         <p:spPr>
           <a:xfrm>
-            <a:off x="1071538" y="5429264"/>
+            <a:off x="1071538" y="5572140"/>
             <a:ext cx="1928826" cy="642942"/>
           </a:xfrm>
           <a:prstGeom prst="rect">
@@ -5305,7 +6443,7 @@
         </p:nvSpPr>
         <p:spPr>
           <a:xfrm>
-            <a:off x="3643306" y="4804958"/>
+            <a:off x="3643306" y="4947834"/>
             <a:ext cx="3246402" cy="830997"/>
           </a:xfrm>
           <a:prstGeom prst="rect">
@@ -5397,11 +6535,7 @@
           <a:p>
             <a:r>
               <a:rPr lang="en-US" altLang="ko-KR" sz="2800" b="1" dirty="0" smtClean="0"/>
-              <a:t>Raspberry </a:t>
-            </a:r>
-            <a:r>
-              <a:rPr lang="en-US" altLang="ko-KR" sz="2800" b="1" dirty="0" smtClean="0"/>
-              <a:t>Pi</a:t>
+              <a:t>Raspberry Pi</a:t>
             </a:r>
             <a:r>
               <a:rPr lang="ko-KR" altLang="en-US" sz="2800" b="1" dirty="0" smtClean="0"/>
@@ -5409,11 +6543,7 @@
             </a:r>
             <a:r>
               <a:rPr lang="en-US" altLang="ko-KR" sz="2800" b="1" dirty="0" smtClean="0"/>
-              <a:t>+ </a:t>
-            </a:r>
-            <a:r>
-              <a:rPr lang="en-US" altLang="ko-KR" sz="2800" b="1" dirty="0" smtClean="0"/>
-              <a:t>NCS Setup</a:t>
+              <a:t>+ NCS Setup</a:t>
             </a:r>
             <a:endParaRPr lang="ko-KR" altLang="en-US" sz="2800" b="1" dirty="0"/>
           </a:p>
@@ -5431,8 +6561,8 @@
         </p:nvSpPr>
         <p:spPr>
           <a:xfrm>
-            <a:off x="457200" y="1428736"/>
-            <a:ext cx="8229600" cy="5214974"/>
+            <a:off x="457200" y="1142984"/>
+            <a:ext cx="8401080" cy="5214974"/>
           </a:xfrm>
         </p:spPr>
         <p:txBody>
@@ -5442,6 +6572,45 @@
           <a:lstStyle/>
           <a:p>
             <a:pPr marL="450850" indent="-450850">
+              <a:lnSpc>
+                <a:spcPct val="150000"/>
+              </a:lnSpc>
+              <a:spcBef>
+                <a:spcPts val="100"/>
+              </a:spcBef>
+              <a:buNone/>
+            </a:pPr>
+            <a:r>
+              <a:rPr lang="en-US" altLang="ko-KR" sz="2400" b="1" dirty="0" smtClean="0"/>
+              <a:t>[</a:t>
+            </a:r>
+            <a:r>
+              <a:rPr lang="ko-KR" altLang="en-US" sz="2400" b="1" dirty="0" smtClean="0"/>
+              <a:t>방안 </a:t>
+            </a:r>
+            <a:r>
+              <a:rPr lang="en-US" altLang="ko-KR" sz="2400" b="1" dirty="0" smtClean="0"/>
+              <a:t>1 : </a:t>
+            </a:r>
+            <a:r>
+              <a:rPr lang="en-US" altLang="ko-KR" sz="2400" b="1" dirty="0" err="1" smtClean="0"/>
+              <a:t>Raspbian</a:t>
+            </a:r>
+            <a:r>
+              <a:rPr lang="en-US" altLang="ko-KR" sz="2400" b="1" dirty="0" smtClean="0"/>
+              <a:t> OS 10 (Buster) + OpenVINO </a:t>
+            </a:r>
+            <a:r>
+              <a:rPr lang="en-US" altLang="ko-KR" sz="2400" b="1" dirty="0" smtClean="0"/>
+              <a:t>2021.4.2]</a:t>
+            </a:r>
+            <a:endParaRPr lang="en-US" altLang="ko-KR" sz="2400" dirty="0" smtClean="0"/>
+          </a:p>
+          <a:p>
+            <a:pPr marL="450850" indent="-450850">
+              <a:lnSpc>
+                <a:spcPct val="150000"/>
+              </a:lnSpc>
               <a:spcBef>
                 <a:spcPts val="100"/>
               </a:spcBef>
@@ -5454,7 +6623,11 @@
             </a:r>
             <a:r>
               <a:rPr lang="en-US" altLang="ko-KR" sz="2400" dirty="0" smtClean="0"/>
-              <a:t> OS 10 (Buster) </a:t>
+              <a:t> </a:t>
+            </a:r>
+            <a:r>
+              <a:rPr lang="en-US" altLang="ko-KR" sz="2400" dirty="0" smtClean="0"/>
+              <a:t>OS 10 (Buster) </a:t>
             </a:r>
             <a:r>
               <a:rPr lang="ko-KR" altLang="en-US" sz="2400" dirty="0" smtClean="0"/>
@@ -5553,8 +6726,8 @@
         </p:blipFill>
         <p:spPr bwMode="auto">
           <a:xfrm>
-            <a:off x="214283" y="2071678"/>
-            <a:ext cx="3786214" cy="2163551"/>
+            <a:off x="428597" y="2357430"/>
+            <a:ext cx="3571900" cy="2041086"/>
           </a:xfrm>
           <a:prstGeom prst="rect">
             <a:avLst/>
@@ -5590,8 +6763,8 @@
         </p:blipFill>
         <p:spPr bwMode="auto">
           <a:xfrm>
-            <a:off x="214282" y="4357694"/>
-            <a:ext cx="3786214" cy="2384644"/>
+            <a:off x="428596" y="4464217"/>
+            <a:ext cx="3571900" cy="2249664"/>
           </a:xfrm>
           <a:prstGeom prst="rect">
             <a:avLst/>
@@ -5618,7 +6791,7 @@
         </p:nvSpPr>
         <p:spPr>
           <a:xfrm>
-            <a:off x="4071935" y="2357430"/>
+            <a:off x="4071935" y="3286124"/>
             <a:ext cx="5000659" cy="2492990"/>
           </a:xfrm>
           <a:prstGeom prst="rect">
@@ -5651,13 +6824,7 @@
               <a:rPr lang="en-US" altLang="ko-KR" sz="1200" dirty="0" smtClean="0">
                 <a:hlinkClick r:id="rId4"/>
               </a:rPr>
-              <a:t>https://www.raspberrypi.com/software/operating-systems</a:t>
-            </a:r>
-            <a:r>
-              <a:rPr lang="en-US" altLang="ko-KR" sz="1200" dirty="0" smtClean="0">
-                <a:hlinkClick r:id="rId4"/>
-              </a:rPr>
-              <a:t>/</a:t>
+              <a:t>https://www.raspberrypi.com/software/operating-systems/</a:t>
             </a:r>
             <a:endParaRPr lang="en-US" altLang="ko-KR" sz="1600" dirty="0" smtClean="0"/>
           </a:p>
@@ -5763,7 +6930,7 @@
         </p:nvSpPr>
         <p:spPr>
           <a:xfrm>
-            <a:off x="2786050" y="3798890"/>
+            <a:off x="2815681" y="3983572"/>
             <a:ext cx="1000132" cy="142876"/>
           </a:xfrm>
           <a:prstGeom prst="rect">
@@ -5808,8 +6975,8 @@
         </p:nvSpPr>
         <p:spPr>
           <a:xfrm>
-            <a:off x="1449366" y="5267338"/>
-            <a:ext cx="1000132" cy="142876"/>
+            <a:off x="1643042" y="5336661"/>
+            <a:ext cx="857256" cy="92603"/>
           </a:xfrm>
           <a:prstGeom prst="rect">
             <a:avLst/>
@@ -5853,7 +7020,7 @@
         </p:nvSpPr>
         <p:spPr>
           <a:xfrm>
-            <a:off x="3214678" y="5000636"/>
+            <a:off x="3260718" y="5055142"/>
             <a:ext cx="714380" cy="500066"/>
           </a:xfrm>
           <a:prstGeom prst="rect">
@@ -5934,11 +7101,7 @@
           <a:p>
             <a:r>
               <a:rPr lang="en-US" altLang="ko-KR" sz="2800" b="1" dirty="0" smtClean="0"/>
-              <a:t>Raspberry </a:t>
-            </a:r>
-            <a:r>
-              <a:rPr lang="en-US" altLang="ko-KR" sz="2800" b="1" dirty="0" smtClean="0"/>
-              <a:t>Pi</a:t>
+              <a:t>Raspberry Pi</a:t>
             </a:r>
             <a:r>
               <a:rPr lang="ko-KR" altLang="en-US" sz="2800" b="1" dirty="0" smtClean="0"/>
@@ -5946,11 +7109,7 @@
             </a:r>
             <a:r>
               <a:rPr lang="en-US" altLang="ko-KR" sz="2800" b="1" dirty="0" smtClean="0"/>
-              <a:t>4 + </a:t>
-            </a:r>
-            <a:r>
-              <a:rPr lang="en-US" altLang="ko-KR" sz="2800" b="1" dirty="0" smtClean="0"/>
-              <a:t>NCS 2 Setup</a:t>
+              <a:t>+ NCS Setup</a:t>
             </a:r>
             <a:endParaRPr lang="ko-KR" altLang="en-US" sz="2800" b="1" dirty="0"/>
           </a:p>
@@ -5968,8 +7127,8 @@
         </p:nvSpPr>
         <p:spPr>
           <a:xfrm>
-            <a:off x="457200" y="1428736"/>
-            <a:ext cx="8229600" cy="5214974"/>
+            <a:off x="457200" y="1142984"/>
+            <a:ext cx="8401080" cy="5214974"/>
           </a:xfrm>
         </p:spPr>
         <p:txBody>
@@ -5988,68 +7147,57 @@
               <a:buNone/>
             </a:pPr>
             <a:r>
+              <a:rPr lang="en-US" altLang="ko-KR" sz="2400" b="1" dirty="0" smtClean="0"/>
+              <a:t>[</a:t>
+            </a:r>
+            <a:r>
               <a:rPr lang="ko-KR" altLang="en-US" sz="2400" b="1" dirty="0" smtClean="0"/>
               <a:t>방안 </a:t>
             </a:r>
             <a:r>
               <a:rPr lang="en-US" altLang="ko-KR" sz="2400" b="1" dirty="0" smtClean="0"/>
-              <a:t>2 : </a:t>
+              <a:t>1 : </a:t>
             </a:r>
             <a:r>
               <a:rPr lang="en-US" altLang="ko-KR" sz="2400" b="1" dirty="0" err="1" smtClean="0"/>
-              <a:t>Ubuntu</a:t>
+              <a:t>Raspbian</a:t>
             </a:r>
             <a:r>
               <a:rPr lang="en-US" altLang="ko-KR" sz="2400" b="1" dirty="0" smtClean="0"/>
-              <a:t> 20.04 + </a:t>
-            </a:r>
-            <a:r>
-              <a:rPr lang="en-US" altLang="ko-KR" sz="2400" b="1" dirty="0" err="1" smtClean="0"/>
-              <a:t>OpenVINO</a:t>
+              <a:t> OS 10 (Buster) + OpenVINO </a:t>
             </a:r>
             <a:r>
               <a:rPr lang="en-US" altLang="ko-KR" sz="2400" b="1" dirty="0" smtClean="0"/>
-              <a:t> 2022.</a:t>
-            </a:r>
-            <a:endParaRPr lang="en-US" altLang="ko-KR" sz="2400" b="1" dirty="0" smtClean="0"/>
-          </a:p>
-          <a:p>
-            <a:pPr marL="628650" indent="-266700">
+              <a:t>2021.4.2]</a:t>
+            </a:r>
+            <a:endParaRPr lang="en-US" altLang="ko-KR" sz="2400" dirty="0" smtClean="0"/>
+          </a:p>
+          <a:p>
+            <a:pPr marL="457200" indent="-457200">
               <a:lnSpc>
                 <a:spcPct val="150000"/>
               </a:lnSpc>
               <a:spcBef>
                 <a:spcPts val="100"/>
               </a:spcBef>
-              <a:buFont typeface="Wingdings" pitchFamily="2" charset="2"/>
-              <a:buChar char="§"/>
-              <a:tabLst>
-                <a:tab pos="628650" algn="l"/>
-              </a:tabLst>
-            </a:pPr>
-            <a:r>
-              <a:rPr lang="en-US" altLang="ko-KR" sz="1800" dirty="0" smtClean="0"/>
-              <a:t>R</a:t>
-            </a:r>
-            <a:endParaRPr lang="en-US" altLang="ko-KR" sz="1800" dirty="0" smtClean="0"/>
-          </a:p>
-          <a:p>
-            <a:pPr marL="450850" indent="-450850">
-              <a:lnSpc>
-                <a:spcPct val="150000"/>
-              </a:lnSpc>
-              <a:spcBef>
-                <a:spcPts val="100"/>
-              </a:spcBef>
-              <a:buNone/>
-            </a:pPr>
-            <a:endParaRPr lang="en-US" altLang="ko-KR" sz="2400" b="1" dirty="0" smtClean="0"/>
-          </a:p>
-        </p:txBody>
-      </p:sp>
-      <p:sp>
-        <p:nvSpPr>
-          <p:cNvPr id="6" name="TextBox 5"/>
+              <a:buFont typeface="+mj-lt"/>
+              <a:buAutoNum type="arabicParenR" startAt="2"/>
+            </a:pPr>
+            <a:r>
+              <a:rPr lang="en-US" altLang="ko-KR" sz="2400" dirty="0" smtClean="0"/>
+              <a:t>OpenVINO 2021.4 Runtime </a:t>
+            </a:r>
+            <a:r>
+              <a:rPr lang="ko-KR" altLang="en-US" sz="2400" dirty="0" smtClean="0"/>
+              <a:t>설치</a:t>
+            </a:r>
+            <a:endParaRPr lang="en-US" altLang="ko-KR" sz="2400" dirty="0" smtClean="0"/>
+          </a:p>
+        </p:txBody>
+      </p:sp>
+      <p:sp>
+        <p:nvSpPr>
+          <p:cNvPr id="7" name="TextBox 6"/>
           <p:cNvSpPr txBox="1"/>
           <p:nvPr/>
         </p:nvSpPr>
@@ -6100,6 +7248,1479 @@
                 <a:srgbClr val="00B050"/>
               </a:solidFill>
             </a:endParaRPr>
+          </a:p>
+        </p:txBody>
+      </p:sp>
+      <p:sp>
+        <p:nvSpPr>
+          <p:cNvPr id="12" name="TextBox 11"/>
+          <p:cNvSpPr txBox="1"/>
+          <p:nvPr/>
+        </p:nvSpPr>
+        <p:spPr>
+          <a:xfrm>
+            <a:off x="1000100" y="2500306"/>
+            <a:ext cx="7643866" cy="2308324"/>
+          </a:xfrm>
+          <a:prstGeom prst="rect">
+            <a:avLst/>
+          </a:prstGeom>
+          <a:noFill/>
+        </p:spPr>
+        <p:txBody>
+          <a:bodyPr wrap="square" rtlCol="0">
+            <a:spAutoFit/>
+          </a:bodyPr>
+          <a:lstStyle/>
+          <a:p>
+            <a:pPr marL="342900" indent="-342900">
+              <a:buAutoNum type="arabicParenBoth"/>
+            </a:pPr>
+            <a:r>
+              <a:rPr lang="en-US" altLang="ko-KR" sz="1600" b="1" dirty="0" smtClean="0"/>
+              <a:t>Raspberry Pi </a:t>
+            </a:r>
+            <a:r>
+              <a:rPr lang="en-US" altLang="ko-KR" sz="1600" b="1" dirty="0" smtClean="0"/>
+              <a:t>SSH </a:t>
+            </a:r>
+            <a:r>
+              <a:rPr lang="ko-KR" altLang="en-US" sz="1600" b="1" dirty="0" smtClean="0"/>
+              <a:t>접속 </a:t>
+            </a:r>
+            <a:r>
+              <a:rPr lang="en-US" altLang="ko-KR" sz="1600" b="1" dirty="0" smtClean="0"/>
+              <a:t>– Putty </a:t>
+            </a:r>
+            <a:r>
+              <a:rPr lang="ko-KR" altLang="en-US" sz="1600" b="1" dirty="0" smtClean="0"/>
+              <a:t>또는 </a:t>
+            </a:r>
+            <a:r>
+              <a:rPr lang="en-US" altLang="ko-KR" sz="1600" b="1" dirty="0" err="1" smtClean="0"/>
+              <a:t>MobaXterm</a:t>
+            </a:r>
+            <a:r>
+              <a:rPr lang="en-US" altLang="ko-KR" sz="1600" b="1" dirty="0" smtClean="0"/>
+              <a:t> </a:t>
+            </a:r>
+            <a:r>
+              <a:rPr lang="ko-KR" altLang="en-US" sz="1600" b="1" dirty="0" smtClean="0"/>
+              <a:t>사용</a:t>
+            </a:r>
+            <a:endParaRPr lang="en-US" altLang="ko-KR" sz="1600" b="1" dirty="0" smtClean="0"/>
+          </a:p>
+          <a:p>
+            <a:pPr marL="342900" indent="-342900">
+              <a:buAutoNum type="arabicParenBoth"/>
+            </a:pPr>
+            <a:endParaRPr lang="en-US" altLang="ko-KR" sz="1600" dirty="0" smtClean="0"/>
+          </a:p>
+          <a:p>
+            <a:pPr marL="342900" indent="-342900">
+              <a:buAutoNum type="arabicParenBoth"/>
+            </a:pPr>
+            <a:r>
+              <a:rPr lang="en-US" altLang="ko-KR" sz="1600" b="1" dirty="0" err="1" smtClean="0"/>
+              <a:t>m</a:t>
+            </a:r>
+            <a:r>
+              <a:rPr lang="en-US" altLang="ko-KR" sz="1600" b="1" dirty="0" err="1" smtClean="0"/>
+              <a:t>kdir</a:t>
+            </a:r>
+            <a:r>
+              <a:rPr lang="en-US" altLang="ko-KR" sz="1600" b="1" dirty="0" smtClean="0"/>
+              <a:t> </a:t>
+            </a:r>
+            <a:r>
+              <a:rPr lang="en-US" altLang="ko-KR" sz="1600" b="1" dirty="0" err="1" smtClean="0"/>
+              <a:t>intel</a:t>
+            </a:r>
+            <a:r>
+              <a:rPr lang="en-US" altLang="ko-KR" sz="1600" b="1" dirty="0" smtClean="0"/>
+              <a:t> </a:t>
+            </a:r>
+            <a:r>
+              <a:rPr lang="en-US" altLang="ko-KR" sz="1600" dirty="0" smtClean="0"/>
+              <a:t>: </a:t>
+            </a:r>
+            <a:r>
+              <a:rPr lang="en-US" altLang="ko-KR" sz="1600" dirty="0" smtClean="0"/>
+              <a:t>/home/&lt;USER&gt;</a:t>
+            </a:r>
+            <a:r>
+              <a:rPr lang="ko-KR" altLang="en-US" sz="1600" dirty="0" smtClean="0"/>
+              <a:t>에서 </a:t>
+            </a:r>
+            <a:r>
+              <a:rPr lang="en-US" altLang="ko-KR" sz="1600" dirty="0" err="1" smtClean="0"/>
+              <a:t>intel</a:t>
+            </a:r>
+            <a:r>
+              <a:rPr lang="en-US" altLang="ko-KR" sz="1600" dirty="0" smtClean="0"/>
+              <a:t> </a:t>
+            </a:r>
+            <a:r>
+              <a:rPr lang="ko-KR" altLang="en-US" sz="1600" dirty="0" smtClean="0"/>
+              <a:t>디렉토리 생성</a:t>
+            </a:r>
+            <a:endParaRPr lang="en-US" altLang="ko-KR" sz="1600" dirty="0" smtClean="0"/>
+          </a:p>
+          <a:p>
+            <a:pPr marL="342900" indent="-342900">
+              <a:buAutoNum type="arabicParenBoth"/>
+            </a:pPr>
+            <a:endParaRPr lang="en-US" altLang="ko-KR" sz="1600" dirty="0" smtClean="0"/>
+          </a:p>
+          <a:p>
+            <a:pPr marL="342900" indent="-342900">
+              <a:buAutoNum type="arabicParenBoth"/>
+            </a:pPr>
+            <a:r>
+              <a:rPr lang="en-US" altLang="ko-KR" sz="1600" b="1" dirty="0" smtClean="0"/>
+              <a:t>cd </a:t>
+            </a:r>
+            <a:r>
+              <a:rPr lang="en-US" altLang="ko-KR" sz="1600" b="1" dirty="0" err="1" smtClean="0"/>
+              <a:t>intel</a:t>
+            </a:r>
+            <a:r>
+              <a:rPr lang="en-US" altLang="ko-KR" sz="1600" b="1" dirty="0" smtClean="0"/>
+              <a:t> </a:t>
+            </a:r>
+            <a:r>
+              <a:rPr lang="en-US" altLang="ko-KR" sz="1600" dirty="0" smtClean="0"/>
+              <a:t>: </a:t>
+            </a:r>
+            <a:r>
+              <a:rPr lang="en-US" altLang="ko-KR" sz="1600" dirty="0" err="1" smtClean="0"/>
+              <a:t>intel</a:t>
+            </a:r>
+            <a:r>
+              <a:rPr lang="en-US" altLang="ko-KR" sz="1600" dirty="0" smtClean="0"/>
+              <a:t> </a:t>
+            </a:r>
+            <a:r>
+              <a:rPr lang="ko-KR" altLang="en-US" sz="1600" dirty="0" smtClean="0"/>
+              <a:t>디렉토리 이동</a:t>
+            </a:r>
+            <a:endParaRPr lang="en-US" altLang="ko-KR" sz="1600" dirty="0" smtClean="0"/>
+          </a:p>
+          <a:p>
+            <a:pPr marL="342900" indent="-342900">
+              <a:buAutoNum type="arabicParenBoth"/>
+            </a:pPr>
+            <a:endParaRPr lang="en-US" altLang="ko-KR" sz="1600" dirty="0" smtClean="0"/>
+          </a:p>
+          <a:p>
+            <a:pPr marL="342900" indent="-342900">
+              <a:buAutoNum type="arabicParenBoth"/>
+            </a:pPr>
+            <a:r>
+              <a:rPr lang="en-US" altLang="ko-KR" sz="1600" b="1" dirty="0" err="1" smtClean="0"/>
+              <a:t>mkdir</a:t>
+            </a:r>
+            <a:r>
+              <a:rPr lang="en-US" altLang="ko-KR" sz="1600" b="1" dirty="0" smtClean="0"/>
+              <a:t> download </a:t>
+            </a:r>
+            <a:r>
+              <a:rPr lang="en-US" altLang="ko-KR" sz="1600" dirty="0" smtClean="0"/>
+              <a:t>: </a:t>
+            </a:r>
+            <a:r>
+              <a:rPr lang="en-US" altLang="ko-KR" sz="1600" dirty="0" err="1" smtClean="0"/>
+              <a:t>intel</a:t>
+            </a:r>
+            <a:r>
+              <a:rPr lang="en-US" altLang="ko-KR" sz="1600" dirty="0" smtClean="0"/>
+              <a:t> </a:t>
+            </a:r>
+            <a:r>
+              <a:rPr lang="ko-KR" altLang="en-US" sz="1600" dirty="0" smtClean="0"/>
+              <a:t>디렉토리에 </a:t>
+            </a:r>
+            <a:r>
+              <a:rPr lang="en-US" altLang="ko-KR" sz="1600" dirty="0" smtClean="0"/>
+              <a:t>download </a:t>
+            </a:r>
+            <a:r>
+              <a:rPr lang="ko-KR" altLang="en-US" sz="1600" dirty="0" smtClean="0"/>
+              <a:t>생성</a:t>
+            </a:r>
+            <a:endParaRPr lang="en-US" altLang="ko-KR" sz="1600" dirty="0" smtClean="0"/>
+          </a:p>
+          <a:p>
+            <a:pPr marL="342900" indent="-342900">
+              <a:buAutoNum type="arabicParenBoth"/>
+            </a:pPr>
+            <a:endParaRPr lang="en-US" altLang="ko-KR" sz="1600" dirty="0" smtClean="0"/>
+          </a:p>
+          <a:p>
+            <a:pPr marL="342900" indent="-342900">
+              <a:buAutoNum type="arabicParenBoth"/>
+            </a:pPr>
+            <a:r>
+              <a:rPr lang="en-US" altLang="ko-KR" sz="1600" b="1" dirty="0" smtClean="0"/>
+              <a:t>cd download </a:t>
+            </a:r>
+            <a:r>
+              <a:rPr lang="en-US" altLang="ko-KR" sz="1600" dirty="0" smtClean="0"/>
+              <a:t>: download </a:t>
+            </a:r>
+            <a:r>
+              <a:rPr lang="ko-KR" altLang="en-US" sz="1600" dirty="0" smtClean="0"/>
+              <a:t>디렉토리 이동</a:t>
+            </a:r>
+            <a:endParaRPr lang="en-US" altLang="ko-KR" sz="1600" dirty="0" smtClean="0"/>
+          </a:p>
+        </p:txBody>
+      </p:sp>
+    </p:spTree>
+  </p:cSld>
+  <p:clrMapOvr>
+    <a:masterClrMapping/>
+  </p:clrMapOvr>
+</p:sld>
+</file>
+
+<file path=ppt/slides/slide8.xml><?xml version="1.0" encoding="utf-8"?>
+<p:sld xmlns:a="http://schemas.openxmlformats.org/drawingml/2006/main" xmlns:r="http://schemas.openxmlformats.org/officeDocument/2006/relationships" xmlns:p="http://schemas.openxmlformats.org/presentationml/2006/main">
+  <p:cSld>
+    <p:spTree>
+      <p:nvGrpSpPr>
+        <p:cNvPr id="1" name=""/>
+        <p:cNvGrpSpPr/>
+        <p:nvPr/>
+      </p:nvGrpSpPr>
+      <p:grpSpPr>
+        <a:xfrm>
+          <a:off x="0" y="0"/>
+          <a:ext cx="0" cy="0"/>
+          <a:chOff x="0" y="0"/>
+          <a:chExt cx="0" cy="0"/>
+        </a:xfrm>
+      </p:grpSpPr>
+      <p:sp>
+        <p:nvSpPr>
+          <p:cNvPr id="4" name="Title 3"/>
+          <p:cNvSpPr>
+            <a:spLocks noGrp="1"/>
+          </p:cNvSpPr>
+          <p:nvPr>
+            <p:ph type="title"/>
+          </p:nvPr>
+        </p:nvSpPr>
+        <p:spPr/>
+        <p:txBody>
+          <a:bodyPr>
+            <a:noAutofit/>
+          </a:bodyPr>
+          <a:lstStyle/>
+          <a:p>
+            <a:r>
+              <a:rPr lang="en-US" altLang="ko-KR" sz="2800" b="1" dirty="0" smtClean="0"/>
+              <a:t>Raspberry Pi</a:t>
+            </a:r>
+            <a:r>
+              <a:rPr lang="ko-KR" altLang="en-US" sz="2800" b="1" dirty="0" smtClean="0"/>
+              <a:t> </a:t>
+            </a:r>
+            <a:r>
+              <a:rPr lang="en-US" altLang="ko-KR" sz="2800" b="1" dirty="0" smtClean="0"/>
+              <a:t>+ NCS Setup</a:t>
+            </a:r>
+            <a:endParaRPr lang="ko-KR" altLang="en-US" sz="2800" b="1" dirty="0"/>
+          </a:p>
+        </p:txBody>
+      </p:sp>
+      <p:sp>
+        <p:nvSpPr>
+          <p:cNvPr id="5" name="Content Placeholder 4"/>
+          <p:cNvSpPr>
+            <a:spLocks noGrp="1"/>
+          </p:cNvSpPr>
+          <p:nvPr>
+            <p:ph idx="1"/>
+          </p:nvPr>
+        </p:nvSpPr>
+        <p:spPr>
+          <a:xfrm>
+            <a:off x="457200" y="1142984"/>
+            <a:ext cx="8401080" cy="5214974"/>
+          </a:xfrm>
+        </p:spPr>
+        <p:txBody>
+          <a:bodyPr>
+            <a:noAutofit/>
+          </a:bodyPr>
+          <a:lstStyle/>
+          <a:p>
+            <a:pPr marL="450850" indent="-450850">
+              <a:lnSpc>
+                <a:spcPct val="150000"/>
+              </a:lnSpc>
+              <a:spcBef>
+                <a:spcPts val="100"/>
+              </a:spcBef>
+              <a:buNone/>
+            </a:pPr>
+            <a:r>
+              <a:rPr lang="en-US" altLang="ko-KR" sz="2400" b="1" dirty="0" smtClean="0"/>
+              <a:t>[</a:t>
+            </a:r>
+            <a:r>
+              <a:rPr lang="ko-KR" altLang="en-US" sz="2400" b="1" dirty="0" smtClean="0"/>
+              <a:t>방안 </a:t>
+            </a:r>
+            <a:r>
+              <a:rPr lang="en-US" altLang="ko-KR" sz="2400" b="1" dirty="0" smtClean="0"/>
+              <a:t>1 : </a:t>
+            </a:r>
+            <a:r>
+              <a:rPr lang="en-US" altLang="ko-KR" sz="2400" b="1" dirty="0" err="1" smtClean="0"/>
+              <a:t>Raspbian</a:t>
+            </a:r>
+            <a:r>
+              <a:rPr lang="en-US" altLang="ko-KR" sz="2400" b="1" dirty="0" smtClean="0"/>
+              <a:t> OS 10 (Buster) + OpenVINO </a:t>
+            </a:r>
+            <a:r>
+              <a:rPr lang="en-US" altLang="ko-KR" sz="2400" b="1" dirty="0" smtClean="0"/>
+              <a:t>2021.4.2]</a:t>
+            </a:r>
+            <a:endParaRPr lang="en-US" altLang="ko-KR" sz="2400" dirty="0" smtClean="0"/>
+          </a:p>
+          <a:p>
+            <a:pPr marL="457200" indent="-457200">
+              <a:lnSpc>
+                <a:spcPct val="150000"/>
+              </a:lnSpc>
+              <a:spcBef>
+                <a:spcPts val="100"/>
+              </a:spcBef>
+              <a:buFont typeface="+mj-lt"/>
+              <a:buAutoNum type="arabicParenR" startAt="2"/>
+            </a:pPr>
+            <a:r>
+              <a:rPr lang="en-US" altLang="ko-KR" sz="2400" dirty="0" smtClean="0"/>
+              <a:t>OpenVINO 2021.4 Runtime </a:t>
+            </a:r>
+            <a:r>
+              <a:rPr lang="ko-KR" altLang="en-US" sz="2400" dirty="0" smtClean="0"/>
+              <a:t>설치</a:t>
+            </a:r>
+            <a:endParaRPr lang="en-US" altLang="ko-KR" sz="2400" dirty="0" smtClean="0"/>
+          </a:p>
+        </p:txBody>
+      </p:sp>
+      <p:sp>
+        <p:nvSpPr>
+          <p:cNvPr id="7" name="TextBox 6"/>
+          <p:cNvSpPr txBox="1"/>
+          <p:nvPr/>
+        </p:nvSpPr>
+        <p:spPr>
+          <a:xfrm>
+            <a:off x="7215206" y="785794"/>
+            <a:ext cx="1632178" cy="276999"/>
+          </a:xfrm>
+          <a:prstGeom prst="rect">
+            <a:avLst/>
+          </a:prstGeom>
+          <a:noFill/>
+        </p:spPr>
+        <p:txBody>
+          <a:bodyPr wrap="none" rtlCol="0">
+            <a:spAutoFit/>
+          </a:bodyPr>
+          <a:lstStyle/>
+          <a:p>
+            <a:r>
+              <a:rPr lang="en-US" altLang="ko-KR" sz="1200" b="1" dirty="0" smtClean="0">
+                <a:solidFill>
+                  <a:srgbClr val="00B050"/>
+                </a:solidFill>
+                <a:latin typeface="맑은 고딕"/>
+                <a:ea typeface="맑은 고딕"/>
+              </a:rPr>
+              <a:t>※ </a:t>
+            </a:r>
+            <a:r>
+              <a:rPr lang="en-US" altLang="ko-KR" sz="1200" b="1" dirty="0" smtClean="0">
+                <a:solidFill>
+                  <a:srgbClr val="00B050"/>
+                </a:solidFill>
+              </a:rPr>
+              <a:t>2022. 12. 27 </a:t>
+            </a:r>
+            <a:r>
+              <a:rPr lang="ko-KR" altLang="en-US" sz="1200" b="1" dirty="0" smtClean="0">
+                <a:solidFill>
+                  <a:srgbClr val="00B050"/>
+                </a:solidFill>
+              </a:rPr>
+              <a:t>기준</a:t>
+            </a:r>
+            <a:endParaRPr lang="ko-KR" altLang="en-US" sz="1200" b="1" dirty="0">
+              <a:solidFill>
+                <a:srgbClr val="00B050"/>
+              </a:solidFill>
+            </a:endParaRPr>
+          </a:p>
+        </p:txBody>
+      </p:sp>
+      <p:sp>
+        <p:nvSpPr>
+          <p:cNvPr id="12" name="TextBox 11"/>
+          <p:cNvSpPr txBox="1"/>
+          <p:nvPr/>
+        </p:nvSpPr>
+        <p:spPr>
+          <a:xfrm>
+            <a:off x="1000100" y="2500306"/>
+            <a:ext cx="7358114" cy="4278094"/>
+          </a:xfrm>
+          <a:prstGeom prst="rect">
+            <a:avLst/>
+          </a:prstGeom>
+          <a:noFill/>
+        </p:spPr>
+        <p:txBody>
+          <a:bodyPr wrap="square" rtlCol="0">
+            <a:spAutoFit/>
+          </a:bodyPr>
+          <a:lstStyle/>
+          <a:p>
+            <a:pPr marL="342900" indent="-342900">
+              <a:buFont typeface="Wingdings" pitchFamily="2" charset="2"/>
+              <a:buAutoNum type="arabicParenBoth" startAt="6"/>
+            </a:pPr>
+            <a:r>
+              <a:rPr lang="pt-BR" sz="1600" b="1" dirty="0" smtClean="0"/>
+              <a:t>sudo </a:t>
+            </a:r>
+            <a:r>
+              <a:rPr lang="pt-BR" sz="1600" b="1" dirty="0" smtClean="0"/>
+              <a:t>wget https://storage.openvinotoolkit.org/repositories/openvino/packages/2021.4.2/linux/ l_openvino_toolkit_runtime_raspbian_p_2021.4.752.tgz -O </a:t>
+            </a:r>
+            <a:r>
+              <a:rPr lang="pt-BR" sz="1600" b="1" dirty="0" smtClean="0"/>
+              <a:t>openvino_2021.4.2.tgz</a:t>
+            </a:r>
+          </a:p>
+          <a:p>
+            <a:pPr marL="342900" indent="-342900"/>
+            <a:r>
+              <a:rPr lang="pt-BR" sz="1600" dirty="0" smtClean="0"/>
+              <a:t> </a:t>
+            </a:r>
+            <a:r>
+              <a:rPr lang="pt-BR" sz="1600" dirty="0" smtClean="0"/>
+              <a:t>    : OpenVINO 2021.4.2 </a:t>
+            </a:r>
+            <a:r>
+              <a:rPr lang="ko-KR" altLang="en-US" sz="1600" dirty="0" smtClean="0"/>
+              <a:t>다운로드</a:t>
+            </a:r>
+            <a:endParaRPr lang="en-US" altLang="ko-KR" sz="1600" dirty="0" smtClean="0"/>
+          </a:p>
+          <a:p>
+            <a:pPr marL="342900" indent="-342900">
+              <a:buAutoNum type="arabicParenBoth" startAt="6"/>
+            </a:pPr>
+            <a:endParaRPr lang="en-US" altLang="ko-KR" sz="1600" dirty="0" smtClean="0"/>
+          </a:p>
+          <a:p>
+            <a:pPr marL="342900" indent="-342900">
+              <a:buAutoNum type="arabicParenBoth" startAt="6"/>
+            </a:pPr>
+            <a:endParaRPr lang="en-US" altLang="ko-KR" sz="1600" dirty="0" smtClean="0"/>
+          </a:p>
+          <a:p>
+            <a:pPr marL="342900" indent="-342900">
+              <a:buAutoNum type="arabicParenBoth" startAt="6"/>
+            </a:pPr>
+            <a:endParaRPr lang="en-US" altLang="ko-KR" sz="1600" dirty="0" smtClean="0"/>
+          </a:p>
+          <a:p>
+            <a:pPr marL="342900" indent="-342900">
+              <a:buAutoNum type="arabicParenBoth" startAt="6"/>
+            </a:pPr>
+            <a:endParaRPr lang="en-US" altLang="ko-KR" sz="1600" dirty="0" smtClean="0"/>
+          </a:p>
+          <a:p>
+            <a:pPr marL="342900" indent="-342900">
+              <a:buAutoNum type="arabicParenBoth" startAt="6"/>
+            </a:pPr>
+            <a:endParaRPr lang="en-US" altLang="ko-KR" sz="1600" dirty="0" smtClean="0"/>
+          </a:p>
+          <a:p>
+            <a:pPr marL="342900" indent="-342900">
+              <a:buAutoNum type="arabicParenBoth" startAt="6"/>
+            </a:pPr>
+            <a:endParaRPr lang="en-US" altLang="ko-KR" sz="1600" dirty="0" smtClean="0"/>
+          </a:p>
+          <a:p>
+            <a:pPr marL="342900" indent="-342900">
+              <a:buAutoNum type="arabicParenBoth" startAt="6"/>
+            </a:pPr>
+            <a:endParaRPr lang="en-US" altLang="ko-KR" sz="1600" dirty="0" smtClean="0"/>
+          </a:p>
+          <a:p>
+            <a:pPr marL="342900" indent="-342900">
+              <a:buAutoNum type="arabicParenBoth" startAt="6"/>
+            </a:pPr>
+            <a:endParaRPr lang="en-US" altLang="ko-KR" sz="1600" dirty="0" smtClean="0"/>
+          </a:p>
+          <a:p>
+            <a:pPr marL="342900" indent="-342900">
+              <a:buAutoNum type="arabicParenBoth" startAt="6"/>
+            </a:pPr>
+            <a:endParaRPr lang="en-US" altLang="ko-KR" sz="1600" dirty="0" smtClean="0"/>
+          </a:p>
+          <a:p>
+            <a:pPr marL="342900" indent="-342900">
+              <a:buAutoNum type="arabicParenBoth" startAt="6"/>
+            </a:pPr>
+            <a:endParaRPr lang="en-US" altLang="ko-KR" sz="1600" dirty="0" smtClean="0"/>
+          </a:p>
+          <a:p>
+            <a:pPr marL="342900" indent="-342900">
+              <a:buAutoNum type="arabicParenBoth" startAt="6"/>
+            </a:pPr>
+            <a:endParaRPr lang="en-US" altLang="ko-KR" sz="1600" dirty="0" smtClean="0"/>
+          </a:p>
+          <a:p>
+            <a:pPr marL="342900" indent="-342900"/>
+            <a:endParaRPr lang="en-US" altLang="ko-KR" sz="1600" dirty="0" smtClean="0"/>
+          </a:p>
+          <a:p>
+            <a:pPr marL="342900" indent="-342900">
+              <a:buFont typeface="Wingdings" pitchFamily="2" charset="2"/>
+              <a:buAutoNum type="arabicParenBoth" startAt="7"/>
+            </a:pPr>
+            <a:r>
+              <a:rPr lang="en-US" sz="1600" b="1" dirty="0" smtClean="0"/>
+              <a:t>sudo tar -</a:t>
+            </a:r>
+            <a:r>
+              <a:rPr lang="en-US" sz="1600" b="1" dirty="0" err="1" smtClean="0"/>
+              <a:t>xf</a:t>
+            </a:r>
+            <a:r>
+              <a:rPr lang="en-US" sz="1600" b="1" dirty="0" smtClean="0"/>
+              <a:t> </a:t>
+            </a:r>
+            <a:r>
+              <a:rPr lang="en-US" sz="1600" b="1" dirty="0" smtClean="0"/>
+              <a:t>openvino_2021.4.2.tgz </a:t>
+            </a:r>
+            <a:r>
+              <a:rPr lang="en-US" sz="1600" dirty="0" smtClean="0"/>
+              <a:t>: </a:t>
+            </a:r>
+            <a:r>
+              <a:rPr lang="ko-KR" altLang="en-US" sz="1600" dirty="0" smtClean="0"/>
+              <a:t>압축 해제</a:t>
+            </a:r>
+            <a:endParaRPr lang="en-US" altLang="ko-KR" sz="1600" dirty="0" smtClean="0"/>
+          </a:p>
+        </p:txBody>
+      </p:sp>
+      <p:pic>
+        <p:nvPicPr>
+          <p:cNvPr id="4098" name="Picture 2"/>
+          <p:cNvPicPr>
+            <a:picLocks noChangeAspect="1" noChangeArrowheads="1"/>
+          </p:cNvPicPr>
+          <p:nvPr/>
+        </p:nvPicPr>
+        <p:blipFill>
+          <a:blip r:embed="rId2"/>
+          <a:srcRect r="46988" b="33486"/>
+          <a:stretch>
+            <a:fillRect/>
+          </a:stretch>
+        </p:blipFill>
+        <p:spPr bwMode="auto">
+          <a:xfrm>
+            <a:off x="161894" y="3662546"/>
+            <a:ext cx="2952771" cy="2104663"/>
+          </a:xfrm>
+          <a:prstGeom prst="rect">
+            <a:avLst/>
+          </a:prstGeom>
+          <a:noFill/>
+          <a:ln w="9525">
+            <a:solidFill>
+              <a:schemeClr val="tx1"/>
+            </a:solidFill>
+            <a:miter lim="800000"/>
+            <a:headEnd/>
+            <a:tailEnd/>
+          </a:ln>
+          <a:effectLst/>
+        </p:spPr>
+      </p:pic>
+      <p:pic>
+        <p:nvPicPr>
+          <p:cNvPr id="4099" name="Picture 3"/>
+          <p:cNvPicPr>
+            <a:picLocks noChangeAspect="1" noChangeArrowheads="1"/>
+          </p:cNvPicPr>
+          <p:nvPr/>
+        </p:nvPicPr>
+        <p:blipFill>
+          <a:blip r:embed="rId3"/>
+          <a:srcRect/>
+          <a:stretch>
+            <a:fillRect/>
+          </a:stretch>
+        </p:blipFill>
+        <p:spPr bwMode="auto">
+          <a:xfrm>
+            <a:off x="5500694" y="3643314"/>
+            <a:ext cx="2214578" cy="2129402"/>
+          </a:xfrm>
+          <a:prstGeom prst="rect">
+            <a:avLst/>
+          </a:prstGeom>
+          <a:noFill/>
+          <a:ln w="9525">
+            <a:solidFill>
+              <a:schemeClr val="tx1"/>
+            </a:solidFill>
+            <a:miter lim="800000"/>
+            <a:headEnd/>
+            <a:tailEnd/>
+          </a:ln>
+          <a:effectLst/>
+        </p:spPr>
+      </p:pic>
+      <p:pic>
+        <p:nvPicPr>
+          <p:cNvPr id="4100" name="Picture 4"/>
+          <p:cNvPicPr>
+            <a:picLocks noChangeAspect="1" noChangeArrowheads="1"/>
+          </p:cNvPicPr>
+          <p:nvPr/>
+        </p:nvPicPr>
+        <p:blipFill>
+          <a:blip r:embed="rId4"/>
+          <a:srcRect t="72340"/>
+          <a:stretch>
+            <a:fillRect/>
+          </a:stretch>
+        </p:blipFill>
+        <p:spPr bwMode="auto">
+          <a:xfrm>
+            <a:off x="142844" y="5838970"/>
+            <a:ext cx="6923104" cy="518988"/>
+          </a:xfrm>
+          <a:prstGeom prst="rect">
+            <a:avLst/>
+          </a:prstGeom>
+          <a:noFill/>
+          <a:ln w="9525">
+            <a:noFill/>
+            <a:miter lim="800000"/>
+            <a:headEnd/>
+            <a:tailEnd/>
+          </a:ln>
+          <a:effectLst/>
+        </p:spPr>
+      </p:pic>
+      <p:sp>
+        <p:nvSpPr>
+          <p:cNvPr id="9" name="Rectangle 8"/>
+          <p:cNvSpPr/>
+          <p:nvPr/>
+        </p:nvSpPr>
+        <p:spPr>
+          <a:xfrm>
+            <a:off x="226980" y="4714884"/>
+            <a:ext cx="2006615" cy="142876"/>
+          </a:xfrm>
+          <a:prstGeom prst="rect">
+            <a:avLst/>
+          </a:prstGeom>
+          <a:solidFill>
+            <a:schemeClr val="accent1">
+              <a:alpha val="30000"/>
+            </a:schemeClr>
+          </a:solidFill>
+        </p:spPr>
+        <p:style>
+          <a:lnRef idx="2">
+            <a:schemeClr val="accent1">
+              <a:shade val="50000"/>
+            </a:schemeClr>
+          </a:lnRef>
+          <a:fillRef idx="1">
+            <a:schemeClr val="accent1"/>
+          </a:fillRef>
+          <a:effectRef idx="0">
+            <a:schemeClr val="accent1"/>
+          </a:effectRef>
+          <a:fontRef idx="minor">
+            <a:schemeClr val="lt1"/>
+          </a:fontRef>
+        </p:style>
+        <p:txBody>
+          <a:bodyPr rtlCol="0" anchor="ctr"/>
+          <a:lstStyle/>
+          <a:p>
+            <a:pPr algn="ctr"/>
+            <a:endParaRPr lang="ko-KR" altLang="en-US"/>
+          </a:p>
+        </p:txBody>
+      </p:sp>
+      <p:sp>
+        <p:nvSpPr>
+          <p:cNvPr id="10" name="Rectangle 9"/>
+          <p:cNvSpPr/>
+          <p:nvPr/>
+        </p:nvSpPr>
+        <p:spPr>
+          <a:xfrm>
+            <a:off x="3127682" y="4429132"/>
+            <a:ext cx="2428892" cy="755079"/>
+          </a:xfrm>
+          <a:prstGeom prst="rect">
+            <a:avLst/>
+          </a:prstGeom>
+        </p:spPr>
+        <p:txBody>
+          <a:bodyPr wrap="square">
+            <a:spAutoFit/>
+          </a:bodyPr>
+          <a:lstStyle/>
+          <a:p>
+            <a:pPr>
+              <a:lnSpc>
+                <a:spcPct val="150000"/>
+              </a:lnSpc>
+            </a:pPr>
+            <a:r>
+              <a:rPr lang="en-US" altLang="ko-KR" sz="1000" dirty="0" smtClean="0"/>
+              <a:t>https://</a:t>
+            </a:r>
+            <a:r>
+              <a:rPr lang="en-US" altLang="ko-KR" sz="1000" dirty="0" smtClean="0"/>
+              <a:t>storage.openvinotoolkit.org</a:t>
+            </a:r>
+          </a:p>
+          <a:p>
+            <a:pPr>
+              <a:lnSpc>
+                <a:spcPct val="150000"/>
+              </a:lnSpc>
+            </a:pPr>
+            <a:r>
+              <a:rPr lang="en-US" altLang="ko-KR" sz="1000" dirty="0" smtClean="0"/>
+              <a:t>/repositories/</a:t>
+            </a:r>
+            <a:r>
+              <a:rPr lang="en-US" altLang="ko-KR" sz="1000" dirty="0" err="1" smtClean="0"/>
+              <a:t>openvino</a:t>
+            </a:r>
+            <a:r>
+              <a:rPr lang="en-US" altLang="ko-KR" sz="1000" dirty="0" smtClean="0"/>
+              <a:t>/packages</a:t>
+            </a:r>
+            <a:r>
+              <a:rPr lang="ko-KR" altLang="en-US" sz="1000" dirty="0" smtClean="0"/>
+              <a:t>에서</a:t>
+            </a:r>
+            <a:endParaRPr lang="en-US" altLang="ko-KR" sz="1000" dirty="0" smtClean="0"/>
+          </a:p>
+          <a:p>
+            <a:pPr>
+              <a:lnSpc>
+                <a:spcPct val="150000"/>
+              </a:lnSpc>
+            </a:pPr>
+            <a:r>
+              <a:rPr lang="en-US" altLang="ko-KR" sz="1000" dirty="0" err="1" smtClean="0"/>
+              <a:t>Raspbian</a:t>
+            </a:r>
+            <a:r>
+              <a:rPr lang="en-US" altLang="ko-KR" sz="1000" dirty="0" smtClean="0"/>
+              <a:t> OS</a:t>
+            </a:r>
+            <a:r>
+              <a:rPr lang="ko-KR" altLang="en-US" sz="1000" dirty="0" smtClean="0"/>
+              <a:t>용 패키지가 있는지 확인</a:t>
+            </a:r>
+            <a:endParaRPr lang="en-US" altLang="ko-KR" sz="1000" dirty="0" smtClean="0"/>
+          </a:p>
+        </p:txBody>
+      </p:sp>
+      <p:sp>
+        <p:nvSpPr>
+          <p:cNvPr id="11" name="Rectangle 10"/>
+          <p:cNvSpPr/>
+          <p:nvPr/>
+        </p:nvSpPr>
+        <p:spPr>
+          <a:xfrm>
+            <a:off x="5531492" y="3786190"/>
+            <a:ext cx="2112342" cy="663262"/>
+          </a:xfrm>
+          <a:prstGeom prst="rect">
+            <a:avLst/>
+          </a:prstGeom>
+          <a:solidFill>
+            <a:schemeClr val="accent1">
+              <a:alpha val="30000"/>
+            </a:schemeClr>
+          </a:solidFill>
+        </p:spPr>
+        <p:style>
+          <a:lnRef idx="2">
+            <a:schemeClr val="accent1">
+              <a:shade val="50000"/>
+            </a:schemeClr>
+          </a:lnRef>
+          <a:fillRef idx="1">
+            <a:schemeClr val="accent1"/>
+          </a:fillRef>
+          <a:effectRef idx="0">
+            <a:schemeClr val="accent1"/>
+          </a:effectRef>
+          <a:fontRef idx="minor">
+            <a:schemeClr val="lt1"/>
+          </a:fontRef>
+        </p:style>
+        <p:txBody>
+          <a:bodyPr rtlCol="0" anchor="ctr"/>
+          <a:lstStyle/>
+          <a:p>
+            <a:pPr algn="ctr"/>
+            <a:endParaRPr lang="ko-KR" altLang="en-US"/>
+          </a:p>
+        </p:txBody>
+      </p:sp>
+      <p:sp>
+        <p:nvSpPr>
+          <p:cNvPr id="13" name="Rectangle 12"/>
+          <p:cNvSpPr/>
+          <p:nvPr/>
+        </p:nvSpPr>
+        <p:spPr>
+          <a:xfrm>
+            <a:off x="326678" y="6194738"/>
+            <a:ext cx="5643602" cy="163220"/>
+          </a:xfrm>
+          <a:prstGeom prst="rect">
+            <a:avLst/>
+          </a:prstGeom>
+          <a:solidFill>
+            <a:schemeClr val="accent1">
+              <a:alpha val="30000"/>
+            </a:schemeClr>
+          </a:solidFill>
+        </p:spPr>
+        <p:style>
+          <a:lnRef idx="2">
+            <a:schemeClr val="accent1">
+              <a:shade val="50000"/>
+            </a:schemeClr>
+          </a:lnRef>
+          <a:fillRef idx="1">
+            <a:schemeClr val="accent1"/>
+          </a:fillRef>
+          <a:effectRef idx="0">
+            <a:schemeClr val="accent1"/>
+          </a:effectRef>
+          <a:fontRef idx="minor">
+            <a:schemeClr val="lt1"/>
+          </a:fontRef>
+        </p:style>
+        <p:txBody>
+          <a:bodyPr rtlCol="0" anchor="ctr"/>
+          <a:lstStyle/>
+          <a:p>
+            <a:pPr algn="ctr"/>
+            <a:endParaRPr lang="ko-KR" altLang="en-US"/>
+          </a:p>
+        </p:txBody>
+      </p:sp>
+      <p:cxnSp>
+        <p:nvCxnSpPr>
+          <p:cNvPr id="15" name="Shape 14"/>
+          <p:cNvCxnSpPr>
+            <a:stCxn id="13" idx="3"/>
+            <a:endCxn id="11" idx="2"/>
+          </p:cNvCxnSpPr>
+          <p:nvPr/>
+        </p:nvCxnSpPr>
+        <p:spPr>
+          <a:xfrm flipV="1">
+            <a:off x="5970280" y="4449452"/>
+            <a:ext cx="617383" cy="1826896"/>
+          </a:xfrm>
+          <a:prstGeom prst="bentConnector2">
+            <a:avLst/>
+          </a:prstGeom>
+          <a:ln w="34925">
+            <a:tailEnd type="arrow"/>
+          </a:ln>
+        </p:spPr>
+        <p:style>
+          <a:lnRef idx="1">
+            <a:schemeClr val="accent1"/>
+          </a:lnRef>
+          <a:fillRef idx="0">
+            <a:schemeClr val="accent1"/>
+          </a:fillRef>
+          <a:effectRef idx="0">
+            <a:schemeClr val="accent1"/>
+          </a:effectRef>
+          <a:fontRef idx="minor">
+            <a:schemeClr val="tx1"/>
+          </a:fontRef>
+        </p:style>
+      </p:cxnSp>
+      <p:sp>
+        <p:nvSpPr>
+          <p:cNvPr id="16" name="Rectangle 15"/>
+          <p:cNvSpPr/>
+          <p:nvPr/>
+        </p:nvSpPr>
+        <p:spPr>
+          <a:xfrm>
+            <a:off x="7009326" y="4500570"/>
+            <a:ext cx="2071734" cy="1546577"/>
+          </a:xfrm>
+          <a:prstGeom prst="rect">
+            <a:avLst/>
+          </a:prstGeom>
+        </p:spPr>
+        <p:txBody>
+          <a:bodyPr wrap="square">
+            <a:spAutoFit/>
+          </a:bodyPr>
+          <a:lstStyle/>
+          <a:p>
+            <a:pPr>
+              <a:lnSpc>
+                <a:spcPct val="150000"/>
+              </a:lnSpc>
+            </a:pPr>
+            <a:r>
+              <a:rPr lang="ko-KR" altLang="en-US" sz="900" dirty="0" smtClean="0"/>
+              <a:t>패키지에 </a:t>
+            </a:r>
+            <a:r>
+              <a:rPr lang="en-US" altLang="ko-KR" sz="900" dirty="0" smtClean="0"/>
+              <a:t>97-myriad-usbboot.rules</a:t>
+            </a:r>
+            <a:r>
+              <a:rPr lang="ko-KR" altLang="en-US" sz="900" dirty="0" smtClean="0"/>
+              <a:t>가</a:t>
+            </a:r>
+            <a:endParaRPr lang="en-US" altLang="ko-KR" sz="900" dirty="0" smtClean="0"/>
+          </a:p>
+          <a:p>
+            <a:pPr>
+              <a:lnSpc>
+                <a:spcPct val="150000"/>
+              </a:lnSpc>
+            </a:pPr>
+            <a:r>
+              <a:rPr lang="ko-KR" altLang="en-US" sz="900" dirty="0" smtClean="0"/>
+              <a:t>있는지 확인함</a:t>
+            </a:r>
+            <a:endParaRPr lang="en-US" altLang="ko-KR" sz="900" dirty="0" smtClean="0"/>
+          </a:p>
+          <a:p>
+            <a:pPr>
+              <a:lnSpc>
+                <a:spcPct val="150000"/>
+              </a:lnSpc>
+            </a:pPr>
+            <a:r>
+              <a:rPr lang="en-US" altLang="ko-KR" sz="900" dirty="0" smtClean="0"/>
+              <a:t>(NCS 2</a:t>
+            </a:r>
+            <a:r>
+              <a:rPr lang="ko-KR" altLang="en-US" sz="900" dirty="0" smtClean="0"/>
+              <a:t>의 </a:t>
+            </a:r>
+            <a:r>
+              <a:rPr lang="en-US" altLang="ko-KR" sz="900" dirty="0" smtClean="0"/>
+              <a:t>Myriad </a:t>
+            </a:r>
+            <a:r>
+              <a:rPr lang="ko-KR" altLang="en-US" sz="900" dirty="0" smtClean="0"/>
+              <a:t>장치 인식을 위한</a:t>
+            </a:r>
+            <a:endParaRPr lang="en-US" altLang="ko-KR" sz="900" dirty="0" smtClean="0"/>
+          </a:p>
+          <a:p>
+            <a:pPr>
+              <a:lnSpc>
+                <a:spcPct val="150000"/>
+              </a:lnSpc>
+            </a:pPr>
+            <a:r>
+              <a:rPr lang="ko-KR" altLang="en-US" sz="900" dirty="0" smtClean="0"/>
+              <a:t>설정파일 확인</a:t>
+            </a:r>
+            <a:r>
+              <a:rPr lang="en-US" altLang="ko-KR" sz="900" dirty="0" smtClean="0"/>
+              <a:t>)</a:t>
+            </a:r>
+          </a:p>
+          <a:p>
+            <a:pPr>
+              <a:lnSpc>
+                <a:spcPct val="150000"/>
+              </a:lnSpc>
+            </a:pPr>
+            <a:endParaRPr lang="en-US" altLang="ko-KR" sz="900" dirty="0" smtClean="0"/>
+          </a:p>
+          <a:p>
+            <a:pPr>
+              <a:lnSpc>
+                <a:spcPct val="150000"/>
+              </a:lnSpc>
+            </a:pPr>
+            <a:r>
+              <a:rPr lang="en-US" altLang="ko-KR" sz="900" dirty="0" smtClean="0"/>
+              <a:t>Install_NCS_udev_rules.sh</a:t>
+            </a:r>
+            <a:r>
+              <a:rPr lang="ko-KR" altLang="en-US" sz="900" dirty="0" smtClean="0"/>
+              <a:t>가 해당 </a:t>
+            </a:r>
+            <a:endParaRPr lang="en-US" altLang="ko-KR" sz="900" dirty="0" smtClean="0"/>
+          </a:p>
+          <a:p>
+            <a:pPr>
+              <a:lnSpc>
+                <a:spcPct val="150000"/>
+              </a:lnSpc>
+            </a:pPr>
+            <a:r>
+              <a:rPr lang="en-US" altLang="ko-KR" sz="900" dirty="0" smtClean="0"/>
+              <a:t>.rules</a:t>
+            </a:r>
+            <a:r>
+              <a:rPr lang="ko-KR" altLang="en-US" sz="900" dirty="0" smtClean="0"/>
+              <a:t>를 제대로 호출하는지 확인</a:t>
+            </a:r>
+            <a:endParaRPr lang="en-US" altLang="ko-KR" sz="900" dirty="0" smtClean="0"/>
+          </a:p>
+        </p:txBody>
+      </p:sp>
+    </p:spTree>
+  </p:cSld>
+  <p:clrMapOvr>
+    <a:masterClrMapping/>
+  </p:clrMapOvr>
+</p:sld>
+</file>
+
+<file path=ppt/slides/slide9.xml><?xml version="1.0" encoding="utf-8"?>
+<p:sld xmlns:a="http://schemas.openxmlformats.org/drawingml/2006/main" xmlns:r="http://schemas.openxmlformats.org/officeDocument/2006/relationships" xmlns:p="http://schemas.openxmlformats.org/presentationml/2006/main">
+  <p:cSld>
+    <p:spTree>
+      <p:nvGrpSpPr>
+        <p:cNvPr id="1" name=""/>
+        <p:cNvGrpSpPr/>
+        <p:nvPr/>
+      </p:nvGrpSpPr>
+      <p:grpSpPr>
+        <a:xfrm>
+          <a:off x="0" y="0"/>
+          <a:ext cx="0" cy="0"/>
+          <a:chOff x="0" y="0"/>
+          <a:chExt cx="0" cy="0"/>
+        </a:xfrm>
+      </p:grpSpPr>
+      <p:sp>
+        <p:nvSpPr>
+          <p:cNvPr id="4" name="Title 3"/>
+          <p:cNvSpPr>
+            <a:spLocks noGrp="1"/>
+          </p:cNvSpPr>
+          <p:nvPr>
+            <p:ph type="title"/>
+          </p:nvPr>
+        </p:nvSpPr>
+        <p:spPr/>
+        <p:txBody>
+          <a:bodyPr>
+            <a:noAutofit/>
+          </a:bodyPr>
+          <a:lstStyle/>
+          <a:p>
+            <a:r>
+              <a:rPr lang="en-US" altLang="ko-KR" sz="2800" b="1" dirty="0" smtClean="0"/>
+              <a:t>Raspberry Pi</a:t>
+            </a:r>
+            <a:r>
+              <a:rPr lang="ko-KR" altLang="en-US" sz="2800" b="1" dirty="0" smtClean="0"/>
+              <a:t> </a:t>
+            </a:r>
+            <a:r>
+              <a:rPr lang="en-US" altLang="ko-KR" sz="2800" b="1" dirty="0" smtClean="0"/>
+              <a:t>+ NCS Setup</a:t>
+            </a:r>
+            <a:endParaRPr lang="ko-KR" altLang="en-US" sz="2800" b="1" dirty="0"/>
+          </a:p>
+        </p:txBody>
+      </p:sp>
+      <p:sp>
+        <p:nvSpPr>
+          <p:cNvPr id="5" name="Content Placeholder 4"/>
+          <p:cNvSpPr>
+            <a:spLocks noGrp="1"/>
+          </p:cNvSpPr>
+          <p:nvPr>
+            <p:ph idx="1"/>
+          </p:nvPr>
+        </p:nvSpPr>
+        <p:spPr>
+          <a:xfrm>
+            <a:off x="457200" y="1142984"/>
+            <a:ext cx="8401080" cy="5214974"/>
+          </a:xfrm>
+        </p:spPr>
+        <p:txBody>
+          <a:bodyPr>
+            <a:noAutofit/>
+          </a:bodyPr>
+          <a:lstStyle/>
+          <a:p>
+            <a:pPr marL="450850" indent="-450850">
+              <a:lnSpc>
+                <a:spcPct val="150000"/>
+              </a:lnSpc>
+              <a:spcBef>
+                <a:spcPts val="100"/>
+              </a:spcBef>
+              <a:buNone/>
+            </a:pPr>
+            <a:r>
+              <a:rPr lang="en-US" altLang="ko-KR" sz="2400" b="1" dirty="0" smtClean="0"/>
+              <a:t>[</a:t>
+            </a:r>
+            <a:r>
+              <a:rPr lang="ko-KR" altLang="en-US" sz="2400" b="1" dirty="0" smtClean="0"/>
+              <a:t>방안 </a:t>
+            </a:r>
+            <a:r>
+              <a:rPr lang="en-US" altLang="ko-KR" sz="2400" b="1" dirty="0" smtClean="0"/>
+              <a:t>1 : </a:t>
+            </a:r>
+            <a:r>
+              <a:rPr lang="en-US" altLang="ko-KR" sz="2400" b="1" dirty="0" err="1" smtClean="0"/>
+              <a:t>Raspbian</a:t>
+            </a:r>
+            <a:r>
+              <a:rPr lang="en-US" altLang="ko-KR" sz="2400" b="1" dirty="0" smtClean="0"/>
+              <a:t> OS 10 (Buster) + OpenVINO </a:t>
+            </a:r>
+            <a:r>
+              <a:rPr lang="en-US" altLang="ko-KR" sz="2400" b="1" dirty="0" smtClean="0"/>
+              <a:t>2021.4.2]</a:t>
+            </a:r>
+            <a:endParaRPr lang="en-US" altLang="ko-KR" sz="2400" dirty="0" smtClean="0"/>
+          </a:p>
+          <a:p>
+            <a:pPr marL="457200" indent="-457200">
+              <a:lnSpc>
+                <a:spcPct val="150000"/>
+              </a:lnSpc>
+              <a:spcBef>
+                <a:spcPts val="100"/>
+              </a:spcBef>
+              <a:buFont typeface="+mj-lt"/>
+              <a:buAutoNum type="arabicParenR" startAt="2"/>
+            </a:pPr>
+            <a:r>
+              <a:rPr lang="en-US" altLang="ko-KR" sz="2400" dirty="0" smtClean="0"/>
+              <a:t>OpenVINO 2021.4 Runtime </a:t>
+            </a:r>
+            <a:r>
+              <a:rPr lang="ko-KR" altLang="en-US" sz="2400" dirty="0" smtClean="0"/>
+              <a:t>설치</a:t>
+            </a:r>
+            <a:endParaRPr lang="en-US" altLang="ko-KR" sz="2400" dirty="0" smtClean="0"/>
+          </a:p>
+        </p:txBody>
+      </p:sp>
+      <p:sp>
+        <p:nvSpPr>
+          <p:cNvPr id="7" name="TextBox 6"/>
+          <p:cNvSpPr txBox="1"/>
+          <p:nvPr/>
+        </p:nvSpPr>
+        <p:spPr>
+          <a:xfrm>
+            <a:off x="7215206" y="785794"/>
+            <a:ext cx="1632178" cy="276999"/>
+          </a:xfrm>
+          <a:prstGeom prst="rect">
+            <a:avLst/>
+          </a:prstGeom>
+          <a:noFill/>
+        </p:spPr>
+        <p:txBody>
+          <a:bodyPr wrap="none" rtlCol="0">
+            <a:spAutoFit/>
+          </a:bodyPr>
+          <a:lstStyle/>
+          <a:p>
+            <a:r>
+              <a:rPr lang="en-US" altLang="ko-KR" sz="1200" b="1" dirty="0" smtClean="0">
+                <a:solidFill>
+                  <a:srgbClr val="00B050"/>
+                </a:solidFill>
+                <a:latin typeface="맑은 고딕"/>
+                <a:ea typeface="맑은 고딕"/>
+              </a:rPr>
+              <a:t>※ </a:t>
+            </a:r>
+            <a:r>
+              <a:rPr lang="en-US" altLang="ko-KR" sz="1200" b="1" dirty="0" smtClean="0">
+                <a:solidFill>
+                  <a:srgbClr val="00B050"/>
+                </a:solidFill>
+              </a:rPr>
+              <a:t>2022. 12. 27 </a:t>
+            </a:r>
+            <a:r>
+              <a:rPr lang="ko-KR" altLang="en-US" sz="1200" b="1" dirty="0" smtClean="0">
+                <a:solidFill>
+                  <a:srgbClr val="00B050"/>
+                </a:solidFill>
+              </a:rPr>
+              <a:t>기준</a:t>
+            </a:r>
+            <a:endParaRPr lang="ko-KR" altLang="en-US" sz="1200" b="1" dirty="0">
+              <a:solidFill>
+                <a:srgbClr val="00B050"/>
+              </a:solidFill>
+            </a:endParaRPr>
+          </a:p>
+        </p:txBody>
+      </p:sp>
+      <p:sp>
+        <p:nvSpPr>
+          <p:cNvPr id="12" name="TextBox 11"/>
+          <p:cNvSpPr txBox="1"/>
+          <p:nvPr/>
+        </p:nvSpPr>
+        <p:spPr>
+          <a:xfrm>
+            <a:off x="1000100" y="2500306"/>
+            <a:ext cx="7572428" cy="2554545"/>
+          </a:xfrm>
+          <a:prstGeom prst="rect">
+            <a:avLst/>
+          </a:prstGeom>
+          <a:noFill/>
+        </p:spPr>
+        <p:txBody>
+          <a:bodyPr wrap="square" rtlCol="0">
+            <a:spAutoFit/>
+          </a:bodyPr>
+          <a:lstStyle/>
+          <a:p>
+            <a:pPr marL="342900" indent="-342900">
+              <a:buFont typeface="Wingdings" pitchFamily="2" charset="2"/>
+              <a:buAutoNum type="arabicParenBoth" startAt="8"/>
+            </a:pPr>
+            <a:r>
+              <a:rPr lang="en-US" sz="1600" b="1" dirty="0" smtClean="0"/>
+              <a:t>sudo </a:t>
+            </a:r>
+            <a:r>
+              <a:rPr lang="en-US" sz="1600" b="1" dirty="0" err="1" smtClean="0"/>
+              <a:t>mv</a:t>
+            </a:r>
+            <a:r>
+              <a:rPr lang="en-US" sz="1600" b="1" dirty="0" smtClean="0"/>
+              <a:t> </a:t>
+            </a:r>
+            <a:r>
+              <a:rPr lang="pt-BR" sz="1600" b="1" dirty="0" smtClean="0"/>
+              <a:t> l_openvino_toolkit_runtime_raspbian_p_2021.4.752.tgz</a:t>
+            </a:r>
+            <a:r>
+              <a:rPr lang="en-US" sz="1600" b="1" dirty="0" smtClean="0"/>
+              <a:t> /home/&lt;USER&gt;/</a:t>
+            </a:r>
+            <a:r>
+              <a:rPr lang="en-US" sz="1600" b="1" dirty="0" err="1" smtClean="0"/>
+              <a:t>intel</a:t>
+            </a:r>
+            <a:r>
+              <a:rPr lang="en-US" sz="1600" b="1" dirty="0" smtClean="0"/>
+              <a:t>/openvino_2021.4.2 </a:t>
+            </a:r>
+          </a:p>
+          <a:p>
+            <a:pPr marL="342900" indent="-342900"/>
+            <a:r>
+              <a:rPr lang="en-US" sz="1600" dirty="0" smtClean="0"/>
+              <a:t> </a:t>
+            </a:r>
+            <a:r>
+              <a:rPr lang="en-US" sz="1600" dirty="0" smtClean="0"/>
+              <a:t>    : </a:t>
+            </a:r>
+            <a:r>
+              <a:rPr lang="en-US" altLang="ko-KR" sz="1600" dirty="0" err="1" smtClean="0"/>
+              <a:t>intel</a:t>
+            </a:r>
+            <a:r>
+              <a:rPr lang="en-US" altLang="ko-KR" sz="1600" dirty="0" smtClean="0"/>
+              <a:t> </a:t>
+            </a:r>
+            <a:r>
+              <a:rPr lang="ko-KR" altLang="en-US" sz="1600" dirty="0" smtClean="0"/>
+              <a:t>디렉토리로 압축물 이동</a:t>
+            </a:r>
+            <a:endParaRPr lang="en-US" altLang="ko-KR" sz="1600" dirty="0" smtClean="0"/>
+          </a:p>
+          <a:p>
+            <a:pPr marL="342900" indent="-342900">
+              <a:buAutoNum type="arabicParenBoth" startAt="8"/>
+            </a:pPr>
+            <a:endParaRPr lang="en-US" altLang="ko-KR" sz="1600" dirty="0" smtClean="0"/>
+          </a:p>
+          <a:p>
+            <a:pPr marL="342900" indent="-342900">
+              <a:buFont typeface="Wingdings" pitchFamily="2" charset="2"/>
+              <a:buAutoNum type="arabicParenBoth" startAt="9"/>
+            </a:pPr>
+            <a:r>
+              <a:rPr lang="en-US" sz="1600" b="1" dirty="0" smtClean="0"/>
+              <a:t>cd /home/&lt;USER&gt;/</a:t>
+            </a:r>
+            <a:r>
+              <a:rPr lang="en-US" sz="1600" b="1" dirty="0" err="1" smtClean="0"/>
+              <a:t>intel</a:t>
+            </a:r>
+            <a:r>
+              <a:rPr lang="en-US" sz="1600" b="1" dirty="0" smtClean="0"/>
+              <a:t>/openvino_2021.4.2 </a:t>
+            </a:r>
+            <a:r>
+              <a:rPr lang="en-US" sz="1600" dirty="0" smtClean="0"/>
+              <a:t>: </a:t>
+            </a:r>
+            <a:r>
+              <a:rPr lang="en-US" sz="1600" dirty="0" err="1" smtClean="0"/>
+              <a:t>openvino</a:t>
+            </a:r>
+            <a:r>
+              <a:rPr lang="en-US" sz="1600" dirty="0" smtClean="0"/>
+              <a:t> </a:t>
+            </a:r>
+            <a:r>
+              <a:rPr lang="ko-KR" altLang="en-US" sz="1600" dirty="0" smtClean="0"/>
+              <a:t>디렉토리로 이동</a:t>
+            </a:r>
+            <a:endParaRPr lang="en-US" sz="1600" dirty="0" smtClean="0"/>
+          </a:p>
+          <a:p>
+            <a:pPr marL="342900" indent="-342900">
+              <a:buAutoNum type="arabicParenBoth" startAt="9"/>
+            </a:pPr>
+            <a:endParaRPr lang="en-US" sz="1600" dirty="0" smtClean="0"/>
+          </a:p>
+          <a:p>
+            <a:pPr marL="342900" indent="-342900">
+              <a:buAutoNum type="arabicParenBoth" startAt="9"/>
+            </a:pPr>
+            <a:r>
+              <a:rPr lang="en-US" sz="1600" b="1" dirty="0" smtClean="0"/>
+              <a:t> sudo </a:t>
+            </a:r>
+            <a:r>
+              <a:rPr lang="en-US" sz="1600" b="1" dirty="0" smtClean="0"/>
+              <a:t>apt install </a:t>
+            </a:r>
+            <a:r>
+              <a:rPr lang="en-US" sz="1600" b="1" dirty="0" err="1" smtClean="0"/>
+              <a:t>cmake</a:t>
+            </a:r>
+            <a:r>
+              <a:rPr lang="en-US" sz="1600" b="1" dirty="0" smtClean="0"/>
+              <a:t> </a:t>
+            </a:r>
+            <a:r>
+              <a:rPr lang="en-US" sz="1600" dirty="0" smtClean="0"/>
+              <a:t>: </a:t>
+            </a:r>
+            <a:r>
+              <a:rPr lang="en-US" sz="1600" dirty="0" err="1" smtClean="0"/>
+              <a:t>cmake</a:t>
+            </a:r>
+            <a:r>
+              <a:rPr lang="en-US" sz="1600" dirty="0" smtClean="0"/>
+              <a:t> </a:t>
+            </a:r>
+            <a:r>
+              <a:rPr lang="ko-KR" altLang="en-US" sz="1600" dirty="0" smtClean="0"/>
+              <a:t>다운로드</a:t>
+            </a:r>
+            <a:endParaRPr lang="en-US" altLang="ko-KR" sz="1600" dirty="0" smtClean="0"/>
+          </a:p>
+          <a:p>
+            <a:pPr marL="342900" indent="-342900">
+              <a:buAutoNum type="arabicParenBoth" startAt="9"/>
+            </a:pPr>
+            <a:endParaRPr lang="en-US" altLang="ko-KR" sz="1600" dirty="0" smtClean="0"/>
+          </a:p>
+          <a:p>
+            <a:pPr marL="342900" indent="-342900">
+              <a:buFontTx/>
+              <a:buAutoNum type="arabicParenBoth" startAt="9"/>
+            </a:pPr>
+            <a:r>
+              <a:rPr lang="en-US" altLang="ko-KR" sz="1600" b="1" dirty="0" smtClean="0"/>
+              <a:t> sudo </a:t>
+            </a:r>
+            <a:r>
+              <a:rPr lang="en-US" altLang="ko-KR" sz="1600" b="1" dirty="0" smtClean="0"/>
+              <a:t>-E ./</a:t>
+            </a:r>
+            <a:r>
+              <a:rPr lang="en-US" altLang="ko-KR" sz="1600" b="1" dirty="0" err="1" smtClean="0"/>
+              <a:t>install_dependencies</a:t>
+            </a:r>
+            <a:r>
+              <a:rPr lang="en-US" altLang="ko-KR" sz="1600" b="1" dirty="0" smtClean="0"/>
+              <a:t>/install_openvino_dependencies.sh</a:t>
+            </a:r>
+          </a:p>
+          <a:p>
+            <a:pPr marL="342900" indent="-342900"/>
+            <a:r>
+              <a:rPr lang="en-US" altLang="ko-KR" sz="1600" dirty="0" smtClean="0"/>
+              <a:t> </a:t>
+            </a:r>
+            <a:r>
+              <a:rPr lang="en-US" altLang="ko-KR" sz="1600" dirty="0" smtClean="0"/>
+              <a:t>     : </a:t>
+            </a:r>
+            <a:r>
+              <a:rPr lang="ko-KR" altLang="en-US" sz="1600" dirty="0" smtClean="0"/>
+              <a:t>관련 종속성 프로그램 </a:t>
+            </a:r>
+            <a:r>
+              <a:rPr lang="ko-KR" altLang="en-US" sz="1600" dirty="0" smtClean="0"/>
+              <a:t>설치</a:t>
+            </a:r>
+            <a:endParaRPr lang="en-US" altLang="ko-KR" sz="1600" dirty="0" smtClean="0"/>
           </a:p>
         </p:txBody>
       </p:sp>

</xml_diff>

<commit_message>
Edits for handling dependency installation
</commit_message>
<xml_diff>
--- a/Raspberry Pi + NCS Setup.pptx
+++ b/Raspberry Pi + NCS Setup.pptx
@@ -3138,11 +3138,7 @@
             </a:r>
             <a:r>
               <a:rPr lang="en-US" altLang="ko-KR" sz="2400" b="1" dirty="0" smtClean="0"/>
-              <a:t> </a:t>
-            </a:r>
-            <a:r>
-              <a:rPr lang="en-US" altLang="ko-KR" sz="2400" b="1" dirty="0" smtClean="0"/>
-              <a:t>OS 10 (Buster) + OpenVINO 2021.4.2</a:t>
+              <a:t> OS 10 (Buster) + OpenVINO 2021.4.2</a:t>
             </a:r>
           </a:p>
           <a:p>
@@ -3649,11 +3645,7 @@
             </a:r>
             <a:r>
               <a:rPr lang="en-US" altLang="ko-KR" sz="2400" b="1" dirty="0" smtClean="0"/>
-              <a:t> </a:t>
-            </a:r>
-            <a:r>
-              <a:rPr lang="en-US" altLang="ko-KR" sz="2400" b="1" dirty="0" smtClean="0"/>
-              <a:t>OS 10 (Buster) + OpenVINO 2021.4.2]</a:t>
+              <a:t> OS 10 (Buster) + OpenVINO 2021.4.2]</a:t>
             </a:r>
             <a:endParaRPr lang="en-US" altLang="ko-KR" sz="2400" dirty="0" smtClean="0"/>
           </a:p>
@@ -4046,11 +4038,7 @@
             </a:r>
             <a:r>
               <a:rPr lang="en-US" altLang="ko-KR" sz="2400" b="1" dirty="0" smtClean="0"/>
-              <a:t> </a:t>
-            </a:r>
-            <a:r>
-              <a:rPr lang="en-US" altLang="ko-KR" sz="2400" b="1" dirty="0" smtClean="0"/>
-              <a:t>OS 10 (Buster) + OpenVINO 2021.4.2</a:t>
+              <a:t> OS 10 (Buster) + OpenVINO 2021.4.2</a:t>
             </a:r>
           </a:p>
           <a:p>
@@ -4426,11 +4414,7 @@
             </a:r>
             <a:r>
               <a:rPr lang="en-US" altLang="ko-KR" sz="2400" b="1" dirty="0" smtClean="0"/>
-              <a:t> </a:t>
-            </a:r>
-            <a:r>
-              <a:rPr lang="en-US" altLang="ko-KR" sz="2400" b="1" dirty="0" smtClean="0"/>
-              <a:t>OS 10 (Buster) + OpenVINO 2021.4.2]</a:t>
+              <a:t> OS 10 (Buster) + OpenVINO 2021.4.2]</a:t>
             </a:r>
             <a:endParaRPr lang="en-US" altLang="ko-KR" sz="2400" dirty="0" smtClean="0"/>
           </a:p>
@@ -5084,11 +5068,7 @@
             </a:r>
             <a:r>
               <a:rPr lang="en-US" altLang="ko-KR" sz="2400" b="1" dirty="0" smtClean="0"/>
-              <a:t> </a:t>
-            </a:r>
-            <a:r>
-              <a:rPr lang="en-US" altLang="ko-KR" sz="2400" b="1" dirty="0" smtClean="0"/>
-              <a:t>OS 10 (Buster) + OpenVINO 2021.4.2]</a:t>
+              <a:t> OS 10 (Buster) + OpenVINO 2021.4.2]</a:t>
             </a:r>
             <a:endParaRPr lang="en-US" altLang="ko-KR" sz="2400" dirty="0" smtClean="0"/>
           </a:p>
@@ -5540,11 +5520,7 @@
             </a:r>
             <a:r>
               <a:rPr lang="en-US" altLang="ko-KR" sz="2400" b="1" dirty="0" smtClean="0"/>
-              <a:t> </a:t>
-            </a:r>
-            <a:r>
-              <a:rPr lang="en-US" altLang="ko-KR" sz="2400" b="1" dirty="0" smtClean="0"/>
-              <a:t>OS 10 (Buster) + OpenVINO 2021.4.2]</a:t>
+              <a:t> OS 10 (Buster) + OpenVINO 2021.4.2]</a:t>
             </a:r>
             <a:endParaRPr lang="en-US" altLang="ko-KR" sz="2400" dirty="0" smtClean="0"/>
           </a:p>
@@ -6094,11 +6070,7 @@
             </a:r>
             <a:r>
               <a:rPr lang="en-US" altLang="ko-KR" sz="2400" b="1" dirty="0" smtClean="0"/>
-              <a:t> </a:t>
-            </a:r>
-            <a:r>
-              <a:rPr lang="en-US" altLang="ko-KR" sz="2400" b="1" dirty="0" smtClean="0"/>
-              <a:t>OS 10 (Buster) + OpenVINO 2021.4.2]</a:t>
+              <a:t> OS 10 (Buster) + OpenVINO 2021.4.2]</a:t>
             </a:r>
             <a:endParaRPr lang="en-US" altLang="ko-KR" sz="2400" dirty="0" smtClean="0"/>
           </a:p>
@@ -6493,11 +6465,7 @@
             </a:r>
             <a:r>
               <a:rPr lang="en-US" altLang="ko-KR" sz="2400" b="1" dirty="0" smtClean="0"/>
-              <a:t> </a:t>
-            </a:r>
-            <a:r>
-              <a:rPr lang="en-US" altLang="ko-KR" sz="2400" b="1" dirty="0" smtClean="0"/>
-              <a:t>OS 10 (Buster) + OpenVINO 2021.4.2]</a:t>
+              <a:t> OS 10 (Buster) + OpenVINO 2021.4.2]</a:t>
             </a:r>
             <a:endParaRPr lang="en-US" altLang="ko-KR" sz="2400" dirty="0" smtClean="0"/>
           </a:p>
@@ -7305,11 +7273,7 @@
             </a:r>
             <a:r>
               <a:rPr lang="en-US" altLang="ko-KR" sz="2400" b="1" dirty="0" smtClean="0"/>
-              <a:t> </a:t>
-            </a:r>
-            <a:r>
-              <a:rPr lang="en-US" altLang="ko-KR" sz="2400" b="1" dirty="0" smtClean="0"/>
-              <a:t>OS 10 (Buster) + OpenVINO 2021.4.2]</a:t>
+              <a:t> OS 10 (Buster) + OpenVINO 2021.4.2]</a:t>
             </a:r>
             <a:endParaRPr lang="en-US" altLang="ko-KR" sz="2400" dirty="0" smtClean="0"/>
           </a:p>
@@ -7575,6 +7539,98 @@
               <a:t>관련 종속성 프로그램 설치</a:t>
             </a:r>
             <a:endParaRPr lang="en-US" altLang="ko-KR" sz="1600" dirty="0" smtClean="0"/>
+          </a:p>
+        </p:txBody>
+      </p:sp>
+      <p:sp>
+        <p:nvSpPr>
+          <p:cNvPr id="6" name="Rectangle 5"/>
+          <p:cNvSpPr/>
+          <p:nvPr/>
+        </p:nvSpPr>
+        <p:spPr>
+          <a:xfrm>
+            <a:off x="1000100" y="4429132"/>
+            <a:ext cx="7000924" cy="663262"/>
+          </a:xfrm>
+          <a:prstGeom prst="rect">
+            <a:avLst/>
+          </a:prstGeom>
+          <a:noFill/>
+          <a:ln>
+            <a:solidFill>
+              <a:schemeClr val="accent2"/>
+            </a:solidFill>
+          </a:ln>
+        </p:spPr>
+        <p:style>
+          <a:lnRef idx="2">
+            <a:schemeClr val="accent1">
+              <a:shade val="50000"/>
+            </a:schemeClr>
+          </a:lnRef>
+          <a:fillRef idx="1">
+            <a:schemeClr val="accent1"/>
+          </a:fillRef>
+          <a:effectRef idx="0">
+            <a:schemeClr val="accent1"/>
+          </a:effectRef>
+          <a:fontRef idx="minor">
+            <a:schemeClr val="lt1"/>
+          </a:fontRef>
+        </p:style>
+        <p:txBody>
+          <a:bodyPr rtlCol="0" anchor="ctr"/>
+          <a:lstStyle/>
+          <a:p>
+            <a:pPr algn="ctr"/>
+            <a:endParaRPr lang="ko-KR" altLang="en-US"/>
+          </a:p>
+        </p:txBody>
+      </p:sp>
+      <p:sp>
+        <p:nvSpPr>
+          <p:cNvPr id="8" name="TextBox 7"/>
+          <p:cNvSpPr txBox="1"/>
+          <p:nvPr/>
+        </p:nvSpPr>
+        <p:spPr>
+          <a:xfrm>
+            <a:off x="950754" y="5130812"/>
+            <a:ext cx="5894562" cy="369332"/>
+          </a:xfrm>
+          <a:prstGeom prst="rect">
+            <a:avLst/>
+          </a:prstGeom>
+          <a:noFill/>
+        </p:spPr>
+        <p:txBody>
+          <a:bodyPr wrap="none" rtlCol="0">
+            <a:spAutoFit/>
+          </a:bodyPr>
+          <a:lstStyle/>
+          <a:p>
+            <a:r>
+              <a:rPr lang="en-US" altLang="ko-KR" b="1" dirty="0" smtClean="0">
+                <a:solidFill>
+                  <a:schemeClr val="accent2"/>
+                </a:solidFill>
+              </a:rPr>
+              <a:t>Optional : Dependency </a:t>
+            </a:r>
+            <a:r>
+              <a:rPr lang="ko-KR" altLang="en-US" b="1" dirty="0" smtClean="0">
+                <a:solidFill>
+                  <a:schemeClr val="accent2"/>
+                </a:solidFill>
+              </a:rPr>
+              <a:t>문제로 실행 안될 경우 적용함</a:t>
+            </a:r>
+            <a:endParaRPr lang="ko-KR" altLang="en-US" b="1" dirty="0">
+              <a:solidFill>
+                <a:schemeClr val="accent2"/>
+              </a:solidFill>
+            </a:endParaRPr>
           </a:p>
         </p:txBody>
       </p:sp>
@@ -7677,11 +7733,7 @@
             </a:r>
             <a:r>
               <a:rPr lang="en-US" altLang="ko-KR" sz="2400" b="1" dirty="0" smtClean="0"/>
-              <a:t> </a:t>
-            </a:r>
-            <a:r>
-              <a:rPr lang="en-US" altLang="ko-KR" sz="2400" b="1" dirty="0" smtClean="0"/>
-              <a:t>OS 10 (Buster) + OpenVINO 2021.4.2]</a:t>
+              <a:t> OS 10 (Buster) + OpenVINO 2021.4.2]</a:t>
             </a:r>
             <a:endParaRPr lang="en-US" altLang="ko-KR" sz="2400" dirty="0" smtClean="0"/>
           </a:p>

</xml_diff>